<commit_message>
Update 2 on ppt2
</commit_message>
<xml_diff>
--- a/SFM_Projekt_Áttekintés_2.pptx
+++ b/SFM_Projekt_Áttekintés_2.pptx
@@ -12,9 +12,9 @@
     <p:sldId id="269" r:id="rId6"/>
     <p:sldId id="265" r:id="rId7"/>
     <p:sldId id="272" r:id="rId8"/>
-    <p:sldId id="268" r:id="rId9"/>
-    <p:sldId id="260" r:id="rId10"/>
-    <p:sldId id="257" r:id="rId11"/>
+    <p:sldId id="273" r:id="rId9"/>
+    <p:sldId id="268" r:id="rId10"/>
+    <p:sldId id="260" r:id="rId11"/>
   </p:sldIdLst>
   <p:sldSz cx="12192000" cy="6858000"/>
   <p:notesSz cx="6858000" cy="9144000"/>
@@ -4611,7 +4611,7 @@
           <p:cNvPr id="2" name="Cím 1">
             <a:extLst>
               <a:ext uri="{FF2B5EF4-FFF2-40B4-BE49-F238E27FC236}">
-                <a16:creationId xmlns:a16="http://schemas.microsoft.com/office/drawing/2014/main" id="{83324CB0-604C-413A-A33E-E81A89945FCE}"/>
+                <a16:creationId xmlns:a16="http://schemas.microsoft.com/office/drawing/2014/main" id="{B2A0928F-D58D-4CF1-9C6C-0CB712D7A6B9}"/>
               </a:ext>
             </a:extLst>
           </p:cNvPr>
@@ -4619,95 +4619,91 @@
             <a:spLocks noGrp="1"/>
           </p:cNvSpPr>
           <p:nvPr>
-            <p:ph type="title"/>
+            <p:ph type="ctrTitle"/>
           </p:nvPr>
         </p:nvSpPr>
         <p:spPr>
           <a:xfrm>
-            <a:off x="673104" y="1923325"/>
-            <a:ext cx="2880828" cy="3071906"/>
-          </a:xfrm>
-        </p:spPr>
-        <p:txBody>
-          <a:bodyPr vert="horz" lIns="91440" tIns="45720" rIns="91440" bIns="45720" rtlCol="0" anchor="t">
+            <a:off x="660041" y="1325489"/>
+            <a:ext cx="2880828" cy="4513523"/>
+          </a:xfrm>
+        </p:spPr>
+        <p:txBody>
+          <a:bodyPr anchor="t">
             <a:normAutofit/>
           </a:bodyPr>
           <a:lstStyle/>
           <a:p>
+            <a:pPr algn="l"/>
             <a:r>
-              <a:rPr lang="hu-HU" sz="2000" kern="1200" dirty="0">
+              <a:rPr lang="hu-HU" sz="2000" dirty="0">
                 <a:solidFill>
                   <a:srgbClr val="FFFFFF"/>
                 </a:solidFill>
-                <a:latin typeface="+mj-lt"/>
-                <a:ea typeface="+mj-ea"/>
-                <a:cs typeface="+mj-cs"/>
               </a:rPr>
-              <a:t>Még egy-egy almenühöz különböző gombok létrehozása.</a:t>
+              <a:t>A program nem teljesen harmonikus megjelenésre (pl. </a:t>
             </a:r>
-            <a:br>
-              <a:rPr lang="hu-HU" sz="2000" kern="1200" dirty="0">
+            <a:r>
+              <a:rPr lang="hu-HU" sz="2000">
                 <a:solidFill>
                   <a:srgbClr val="FFFFFF"/>
                 </a:solidFill>
-                <a:latin typeface="+mj-lt"/>
-                <a:ea typeface="+mj-ea"/>
-                <a:cs typeface="+mj-cs"/>
               </a:rPr>
-            </a:br>
+              <a:t>színek).</a:t>
+            </a:r>
+            <a:endParaRPr lang="hu-HU" sz="2000" dirty="0">
+              <a:solidFill>
+                <a:srgbClr val="FFFFFF"/>
+              </a:solidFill>
+            </a:endParaRPr>
+          </a:p>
+        </p:txBody>
+      </p:sp>
+      <p:sp>
+        <p:nvSpPr>
+          <p:cNvPr id="3" name="Alcím 2">
+            <a:extLst>
+              <a:ext uri="{FF2B5EF4-FFF2-40B4-BE49-F238E27FC236}">
+                <a16:creationId xmlns:a16="http://schemas.microsoft.com/office/drawing/2014/main" id="{9C9AE997-4508-48BB-8A35-FB9009EFD7B5}"/>
+              </a:ext>
+            </a:extLst>
+          </p:cNvPr>
+          <p:cNvSpPr>
+            <a:spLocks noGrp="1"/>
+          </p:cNvSpPr>
+          <p:nvPr>
+            <p:ph type="subTitle" idx="1"/>
+          </p:nvPr>
+        </p:nvSpPr>
+        <p:spPr>
+          <a:xfrm>
+            <a:off x="640586" y="306501"/>
+            <a:ext cx="2919738" cy="712487"/>
+          </a:xfrm>
+        </p:spPr>
+        <p:txBody>
+          <a:bodyPr anchor="b">
+            <a:normAutofit/>
+          </a:bodyPr>
+          <a:lstStyle/>
+          <a:p>
             <a:r>
-              <a:rPr lang="hu-HU" sz="2000" kern="1200" dirty="0">
+              <a:rPr lang="hu-HU" sz="4400" dirty="0">
                 <a:solidFill>
                   <a:srgbClr val="FFFFFF"/>
                 </a:solidFill>
-                <a:latin typeface="+mj-lt"/>
-                <a:ea typeface="+mj-ea"/>
-                <a:cs typeface="+mj-cs"/>
               </a:rPr>
-              <a:t>Pl.: „Törlés” gomb , amivel az adattáblánkból kitörölhetünk sorokat.  </a:t>
+              <a:t>Design</a:t>
             </a:r>
-            <a:endParaRPr lang="en-US" sz="2000" kern="1200" dirty="0">
-              <a:solidFill>
-                <a:srgbClr val="FFFFFF"/>
-              </a:solidFill>
-              <a:latin typeface="+mj-lt"/>
-              <a:ea typeface="+mj-ea"/>
-              <a:cs typeface="+mj-cs"/>
-            </a:endParaRPr>
-          </a:p>
-        </p:txBody>
-      </p:sp>
-      <p:sp>
-        <p:nvSpPr>
-          <p:cNvPr id="4" name="Tartalom helye 3">
-            <a:extLst>
-              <a:ext uri="{FF2B5EF4-FFF2-40B4-BE49-F238E27FC236}">
-                <a16:creationId xmlns:a16="http://schemas.microsoft.com/office/drawing/2014/main" id="{F57463D6-40D0-4DD8-8A2D-63E3DBAAF1B4}"/>
-              </a:ext>
-            </a:extLst>
-          </p:cNvPr>
-          <p:cNvSpPr>
-            <a:spLocks noGrp="1"/>
-          </p:cNvSpPr>
-          <p:nvPr>
-            <p:ph idx="1"/>
-          </p:nvPr>
-        </p:nvSpPr>
-        <p:spPr/>
-        <p:txBody>
-          <a:bodyPr/>
-          <a:lstStyle/>
-          <a:p>
-            <a:endParaRPr lang="en-US"/>
           </a:p>
         </p:txBody>
       </p:sp>
       <p:pic>
         <p:nvPicPr>
-          <p:cNvPr id="7" name="Kép 6">
-            <a:extLst>
-              <a:ext uri="{FF2B5EF4-FFF2-40B4-BE49-F238E27FC236}">
-                <a16:creationId xmlns:a16="http://schemas.microsoft.com/office/drawing/2014/main" id="{40E41525-C2B3-42BB-A008-8FFE4CF0EFDE}"/>
+          <p:cNvPr id="5" name="Kép 4">
+            <a:extLst>
+              <a:ext uri="{FF2B5EF4-FFF2-40B4-BE49-F238E27FC236}">
+                <a16:creationId xmlns:a16="http://schemas.microsoft.com/office/drawing/2014/main" id="{CFC2D399-5379-465D-9EED-480122B34835}"/>
               </a:ext>
             </a:extLst>
           </p:cNvPr>
@@ -4724,122 +4720,48 @@
         </p:blipFill>
         <p:spPr>
           <a:xfrm>
-            <a:off x="4143840" y="880542"/>
-            <a:ext cx="7716221" cy="5078489"/>
+            <a:off x="4221987" y="306501"/>
+            <a:ext cx="5375711" cy="3538065"/>
           </a:xfrm>
           <a:prstGeom prst="rect">
             <a:avLst/>
           </a:prstGeom>
         </p:spPr>
       </p:pic>
-      <p:sp>
-        <p:nvSpPr>
-          <p:cNvPr id="19" name="Téglalap: lekerekített 18">
-            <a:extLst>
-              <a:ext uri="{FF2B5EF4-FFF2-40B4-BE49-F238E27FC236}">
-                <a16:creationId xmlns:a16="http://schemas.microsoft.com/office/drawing/2014/main" id="{8F40412C-D8BC-46CB-974A-234D7A1E9752}"/>
-              </a:ext>
-            </a:extLst>
-          </p:cNvPr>
-          <p:cNvSpPr/>
+      <p:pic>
+        <p:nvPicPr>
+          <p:cNvPr id="7" name="Kép 6">
+            <a:extLst>
+              <a:ext uri="{FF2B5EF4-FFF2-40B4-BE49-F238E27FC236}">
+                <a16:creationId xmlns:a16="http://schemas.microsoft.com/office/drawing/2014/main" id="{7BCEE858-D66A-4825-ADA0-3F0F3680E17E}"/>
+              </a:ext>
+            </a:extLst>
+          </p:cNvPr>
+          <p:cNvPicPr>
+            <a:picLocks noChangeAspect="1"/>
+          </p:cNvPicPr>
           <p:nvPr/>
-        </p:nvSpPr>
+        </p:nvPicPr>
+        <p:blipFill>
+          <a:blip r:embed="rId3"/>
+          <a:stretch>
+            <a:fillRect/>
+          </a:stretch>
+        </p:blipFill>
         <p:spPr>
           <a:xfrm>
-            <a:off x="8269288" y="5709107"/>
-            <a:ext cx="715689" cy="200934"/>
-          </a:xfrm>
-          <a:prstGeom prst="roundRect">
+            <a:off x="6680544" y="3151979"/>
+            <a:ext cx="5165207" cy="3399520"/>
+          </a:xfrm>
+          <a:prstGeom prst="rect">
             <a:avLst/>
           </a:prstGeom>
-          <a:noFill/>
-          <a:ln w="38100">
-            <a:solidFill>
-              <a:srgbClr val="FF0000"/>
-            </a:solidFill>
-          </a:ln>
-        </p:spPr>
-        <p:style>
-          <a:lnRef idx="2">
-            <a:schemeClr val="accent1">
-              <a:shade val="50000"/>
-            </a:schemeClr>
-          </a:lnRef>
-          <a:fillRef idx="1">
-            <a:schemeClr val="accent1"/>
-          </a:fillRef>
-          <a:effectRef idx="0">
-            <a:schemeClr val="accent1"/>
-          </a:effectRef>
-          <a:fontRef idx="minor">
-            <a:schemeClr val="lt1"/>
-          </a:fontRef>
-        </p:style>
-        <p:txBody>
-          <a:bodyPr rtlCol="0" anchor="ctr"/>
-          <a:lstStyle/>
-          <a:p>
-            <a:pPr algn="ctr"/>
-            <a:endParaRPr lang="hu-HU"/>
-          </a:p>
-        </p:txBody>
-      </p:sp>
-      <p:sp>
-        <p:nvSpPr>
-          <p:cNvPr id="17" name="Téglalap: lekerekített 16">
-            <a:extLst>
-              <a:ext uri="{FF2B5EF4-FFF2-40B4-BE49-F238E27FC236}">
-                <a16:creationId xmlns:a16="http://schemas.microsoft.com/office/drawing/2014/main" id="{C2F2B5A4-F4F4-4A69-A38E-13ABCDDD0FEB}"/>
-              </a:ext>
-            </a:extLst>
-          </p:cNvPr>
-          <p:cNvSpPr/>
-          <p:nvPr/>
-        </p:nvSpPr>
-        <p:spPr>
-          <a:xfrm>
-            <a:off x="10848108" y="1920947"/>
-            <a:ext cx="360219" cy="1958325"/>
-          </a:xfrm>
-          <a:prstGeom prst="roundRect">
-            <a:avLst/>
-          </a:prstGeom>
-          <a:noFill/>
-          <a:ln w="38100">
-            <a:solidFill>
-              <a:srgbClr val="FF0000"/>
-            </a:solidFill>
-          </a:ln>
-        </p:spPr>
-        <p:style>
-          <a:lnRef idx="2">
-            <a:schemeClr val="accent1">
-              <a:shade val="50000"/>
-            </a:schemeClr>
-          </a:lnRef>
-          <a:fillRef idx="1">
-            <a:schemeClr val="accent1"/>
-          </a:fillRef>
-          <a:effectRef idx="0">
-            <a:schemeClr val="accent1"/>
-          </a:effectRef>
-          <a:fontRef idx="minor">
-            <a:schemeClr val="lt1"/>
-          </a:fontRef>
-        </p:style>
-        <p:txBody>
-          <a:bodyPr rtlCol="0" anchor="ctr"/>
-          <a:lstStyle/>
-          <a:p>
-            <a:pPr algn="ctr"/>
-            <a:endParaRPr lang="hu-HU"/>
-          </a:p>
-        </p:txBody>
-      </p:sp>
+        </p:spPr>
+      </p:pic>
     </p:spTree>
     <p:extLst>
       <p:ext uri="{BB962C8B-B14F-4D97-AF65-F5344CB8AC3E}">
-        <p14:creationId xmlns:p14="http://schemas.microsoft.com/office/powerpoint/2010/main" val="3364366076"/>
+        <p14:creationId xmlns:p14="http://schemas.microsoft.com/office/powerpoint/2010/main" val="1968849174"/>
       </p:ext>
     </p:extLst>
   </p:cSld>
@@ -7071,21 +6993,8 @@
                   <a:srgbClr val="FFFFFF"/>
                 </a:solidFill>
               </a:rPr>
-              <a:t>A kiemelt táblázaton keresztül tekinthető meg az </a:t>
+              <a:t>A kiemelt táblázaton keresztül tekinthető meg az adatbázis tartalma.</a:t>
             </a:r>
-            <a:r>
-              <a:rPr lang="hu-HU" sz="2000">
-                <a:solidFill>
-                  <a:srgbClr val="FFFFFF"/>
-                </a:solidFill>
-              </a:rPr>
-              <a:t>adatbázis tartalma.</a:t>
-            </a:r>
-            <a:endParaRPr lang="hu-HU" sz="2000" dirty="0">
-              <a:solidFill>
-                <a:srgbClr val="FFFFFF"/>
-              </a:solidFill>
-            </a:endParaRPr>
           </a:p>
         </p:txBody>
       </p:sp>
@@ -8162,7 +8071,7 @@
         </p:nvSpPr>
         <p:spPr>
           <a:xfrm>
-            <a:off x="1577088" y="3651494"/>
+            <a:off x="1606101" y="3484785"/>
             <a:ext cx="2353828" cy="995205"/>
           </a:xfrm>
           <a:prstGeom prst="rect">
@@ -9872,10 +9781,10 @@
       </p:sp>
       <p:pic>
         <p:nvPicPr>
-          <p:cNvPr id="5" name="Kép 4">
-            <a:extLst>
-              <a:ext uri="{FF2B5EF4-FFF2-40B4-BE49-F238E27FC236}">
-                <a16:creationId xmlns:a16="http://schemas.microsoft.com/office/drawing/2014/main" id="{A1BB6117-0E32-432D-B5E8-EF0F0289D5ED}"/>
+          <p:cNvPr id="8" name="Kép 7">
+            <a:extLst>
+              <a:ext uri="{FF2B5EF4-FFF2-40B4-BE49-F238E27FC236}">
+                <a16:creationId xmlns:a16="http://schemas.microsoft.com/office/drawing/2014/main" id="{BB42B2AC-6586-4B7D-84E6-6C8516D42B40}"/>
               </a:ext>
             </a:extLst>
           </p:cNvPr>
@@ -9892,8 +9801,8 @@
         </p:blipFill>
         <p:spPr>
           <a:xfrm>
-            <a:off x="4792578" y="936284"/>
-            <a:ext cx="6939765" cy="4618721"/>
+            <a:off x="4359496" y="978628"/>
+            <a:ext cx="7511611" cy="4900314"/>
           </a:xfrm>
           <a:prstGeom prst="rect">
             <a:avLst/>
@@ -10014,6 +9923,723 @@
 </file>
 
 <file path=ppt/slides/slide8.xml><?xml version="1.0" encoding="utf-8"?>
+<p:sld xmlns:a="http://schemas.openxmlformats.org/drawingml/2006/main" xmlns:r="http://schemas.openxmlformats.org/officeDocument/2006/relationships" xmlns:p="http://schemas.openxmlformats.org/presentationml/2006/main">
+  <p:cSld>
+    <p:bg>
+      <p:bgPr>
+        <a:solidFill>
+          <a:schemeClr val="bg1"/>
+        </a:solidFill>
+        <a:effectLst/>
+      </p:bgPr>
+    </p:bg>
+    <p:spTree>
+      <p:nvGrpSpPr>
+        <p:cNvPr id="1" name=""/>
+        <p:cNvGrpSpPr/>
+        <p:nvPr/>
+      </p:nvGrpSpPr>
+      <p:grpSpPr>
+        <a:xfrm>
+          <a:off x="0" y="0"/>
+          <a:ext cx="0" cy="0"/>
+          <a:chOff x="0" y="0"/>
+          <a:chExt cx="0" cy="0"/>
+        </a:xfrm>
+      </p:grpSpPr>
+      <p:sp useBgFill="1">
+        <p:nvSpPr>
+          <p:cNvPr id="22" name="Rectangle 21">
+            <a:extLst>
+              <a:ext uri="{FF2B5EF4-FFF2-40B4-BE49-F238E27FC236}">
+                <a16:creationId xmlns:a16="http://schemas.microsoft.com/office/drawing/2014/main" id="{A8384FB5-9ADC-4DDC-881B-597D56F5B15D}"/>
+              </a:ext>
+              <a:ext uri="{C183D7F6-B498-43B3-948B-1728B52AA6E4}">
+                <adec:decorative xmlns:adec="http://schemas.microsoft.com/office/drawing/2017/decorative" val="1"/>
+              </a:ext>
+            </a:extLst>
+          </p:cNvPr>
+          <p:cNvSpPr>
+            <a:spLocks noGrp="1" noRot="1" noChangeAspect="1" noMove="1" noResize="1" noEditPoints="1" noAdjustHandles="1" noChangeArrowheads="1" noChangeShapeType="1" noTextEdit="1"/>
+          </p:cNvSpPr>
+          <p:nvPr>
+            <p:extLst>
+              <p:ext uri="{386F3935-93C4-4BCD-93E2-E3B085C9AB24}">
+                <p16:designElem xmlns:p16="http://schemas.microsoft.com/office/powerpoint/2015/main" val="1"/>
+              </p:ext>
+            </p:extLst>
+          </p:nvPr>
+        </p:nvSpPr>
+        <p:spPr>
+          <a:xfrm>
+            <a:off x="0" y="0"/>
+            <a:ext cx="12192000" cy="6858000"/>
+          </a:xfrm>
+          <a:prstGeom prst="rect">
+            <a:avLst/>
+          </a:prstGeom>
+          <a:ln w="12700" cap="flat" cmpd="sng" algn="ctr">
+            <a:noFill/>
+            <a:prstDash val="solid"/>
+            <a:miter lim="800000"/>
+          </a:ln>
+          <a:effectLst/>
+          <a:extLst>
+            <a:ext uri="{91240B29-F687-4F45-9708-019B960494DF}">
+              <a14:hiddenLine xmlns:a14="http://schemas.microsoft.com/office/drawing/2010/main" w="12700" cap="flat" cmpd="sng" algn="ctr">
+                <a:solidFill>
+                  <a:schemeClr val="accent1">
+                    <a:shade val="50000"/>
+                  </a:schemeClr>
+                </a:solidFill>
+                <a:prstDash val="solid"/>
+                <a:miter lim="800000"/>
+              </a14:hiddenLine>
+            </a:ext>
+          </a:extLst>
+        </p:spPr>
+        <p:style>
+          <a:lnRef idx="2">
+            <a:schemeClr val="accent1">
+              <a:shade val="50000"/>
+            </a:schemeClr>
+          </a:lnRef>
+          <a:fillRef idx="1">
+            <a:schemeClr val="accent1"/>
+          </a:fillRef>
+          <a:effectRef idx="0">
+            <a:schemeClr val="accent1"/>
+          </a:effectRef>
+          <a:fontRef idx="minor">
+            <a:schemeClr val="lt1"/>
+          </a:fontRef>
+        </p:style>
+        <p:txBody>
+          <a:bodyPr rtlCol="0" anchor="ctr"/>
+          <a:lstStyle/>
+          <a:p>
+            <a:pPr algn="ctr"/>
+            <a:endParaRPr lang="en-US"/>
+          </a:p>
+        </p:txBody>
+      </p:sp>
+      <p:sp>
+        <p:nvSpPr>
+          <p:cNvPr id="24" name="Rectangle 23">
+            <a:extLst>
+              <a:ext uri="{FF2B5EF4-FFF2-40B4-BE49-F238E27FC236}">
+                <a16:creationId xmlns:a16="http://schemas.microsoft.com/office/drawing/2014/main" id="{91E5A9A7-95C6-4F4F-B00E-C82E07FE62EF}"/>
+              </a:ext>
+              <a:ext uri="{C183D7F6-B498-43B3-948B-1728B52AA6E4}">
+                <adec:decorative xmlns:adec="http://schemas.microsoft.com/office/drawing/2017/decorative" val="1"/>
+              </a:ext>
+            </a:extLst>
+          </p:cNvPr>
+          <p:cNvSpPr>
+            <a:spLocks noGrp="1" noRot="1" noChangeAspect="1" noMove="1" noResize="1" noEditPoints="1" noAdjustHandles="1" noChangeArrowheads="1" noChangeShapeType="1" noTextEdit="1"/>
+          </p:cNvSpPr>
+          <p:nvPr>
+            <p:extLst>
+              <p:ext uri="{386F3935-93C4-4BCD-93E2-E3B085C9AB24}">
+                <p16:designElem xmlns:p16="http://schemas.microsoft.com/office/powerpoint/2015/main" val="1"/>
+              </p:ext>
+            </p:extLst>
+          </p:nvPr>
+        </p:nvSpPr>
+        <p:spPr>
+          <a:xfrm rot="5400000" flipH="1">
+            <a:off x="-1417539" y="1417538"/>
+            <a:ext cx="6875818" cy="4040744"/>
+          </a:xfrm>
+          <a:prstGeom prst="rect">
+            <a:avLst/>
+          </a:prstGeom>
+          <a:gradFill>
+            <a:gsLst>
+              <a:gs pos="0">
+                <a:srgbClr val="000000"/>
+              </a:gs>
+              <a:gs pos="100000">
+                <a:schemeClr val="accent1">
+                  <a:lumMod val="75000"/>
+                </a:schemeClr>
+              </a:gs>
+            </a:gsLst>
+            <a:lin ang="18600000" scaled="0"/>
+          </a:gradFill>
+          <a:ln>
+            <a:noFill/>
+          </a:ln>
+        </p:spPr>
+        <p:style>
+          <a:lnRef idx="2">
+            <a:schemeClr val="accent1">
+              <a:shade val="50000"/>
+            </a:schemeClr>
+          </a:lnRef>
+          <a:fillRef idx="1">
+            <a:schemeClr val="accent1"/>
+          </a:fillRef>
+          <a:effectRef idx="0">
+            <a:schemeClr val="accent1"/>
+          </a:effectRef>
+          <a:fontRef idx="minor">
+            <a:schemeClr val="lt1"/>
+          </a:fontRef>
+        </p:style>
+        <p:txBody>
+          <a:bodyPr rtlCol="0" anchor="ctr"/>
+          <a:lstStyle/>
+          <a:p>
+            <a:pPr algn="ctr"/>
+            <a:endParaRPr lang="en-US" dirty="0"/>
+          </a:p>
+        </p:txBody>
+      </p:sp>
+      <p:sp>
+        <p:nvSpPr>
+          <p:cNvPr id="26" name="Rectangle 25">
+            <a:extLst>
+              <a:ext uri="{FF2B5EF4-FFF2-40B4-BE49-F238E27FC236}">
+                <a16:creationId xmlns:a16="http://schemas.microsoft.com/office/drawing/2014/main" id="{D07DD2DE-F619-49DD-B5E7-03A290FF4ED1}"/>
+              </a:ext>
+              <a:ext uri="{C183D7F6-B498-43B3-948B-1728B52AA6E4}">
+                <adec:decorative xmlns:adec="http://schemas.microsoft.com/office/drawing/2017/decorative" val="1"/>
+              </a:ext>
+            </a:extLst>
+          </p:cNvPr>
+          <p:cNvSpPr>
+            <a:spLocks noGrp="1" noRot="1" noChangeAspect="1" noMove="1" noResize="1" noEditPoints="1" noAdjustHandles="1" noChangeArrowheads="1" noChangeShapeType="1" noTextEdit="1"/>
+          </p:cNvSpPr>
+          <p:nvPr>
+            <p:extLst>
+              <p:ext uri="{386F3935-93C4-4BCD-93E2-E3B085C9AB24}">
+                <p16:designElem xmlns:p16="http://schemas.microsoft.com/office/powerpoint/2015/main" val="1"/>
+              </p:ext>
+            </p:extLst>
+          </p:nvPr>
+        </p:nvSpPr>
+        <p:spPr>
+          <a:xfrm rot="16200000">
+            <a:off x="-158495" y="2660473"/>
+            <a:ext cx="4355594" cy="4038603"/>
+          </a:xfrm>
+          <a:prstGeom prst="rect">
+            <a:avLst/>
+          </a:prstGeom>
+          <a:gradFill>
+            <a:gsLst>
+              <a:gs pos="0">
+                <a:schemeClr val="accent1">
+                  <a:alpha val="50000"/>
+                </a:schemeClr>
+              </a:gs>
+              <a:gs pos="100000">
+                <a:schemeClr val="accent1">
+                  <a:lumMod val="50000"/>
+                  <a:alpha val="0"/>
+                </a:schemeClr>
+              </a:gs>
+            </a:gsLst>
+            <a:lin ang="11400000" scaled="0"/>
+          </a:gradFill>
+          <a:ln>
+            <a:noFill/>
+          </a:ln>
+        </p:spPr>
+        <p:style>
+          <a:lnRef idx="2">
+            <a:schemeClr val="accent1">
+              <a:shade val="50000"/>
+            </a:schemeClr>
+          </a:lnRef>
+          <a:fillRef idx="1">
+            <a:schemeClr val="accent1"/>
+          </a:fillRef>
+          <a:effectRef idx="0">
+            <a:schemeClr val="accent1"/>
+          </a:effectRef>
+          <a:fontRef idx="minor">
+            <a:schemeClr val="lt1"/>
+          </a:fontRef>
+        </p:style>
+        <p:txBody>
+          <a:bodyPr rtlCol="0" anchor="ctr"/>
+          <a:lstStyle/>
+          <a:p>
+            <a:pPr algn="ctr"/>
+            <a:endParaRPr lang="en-US"/>
+          </a:p>
+        </p:txBody>
+      </p:sp>
+      <p:sp>
+        <p:nvSpPr>
+          <p:cNvPr id="28" name="Rectangle 27">
+            <a:extLst>
+              <a:ext uri="{FF2B5EF4-FFF2-40B4-BE49-F238E27FC236}">
+                <a16:creationId xmlns:a16="http://schemas.microsoft.com/office/drawing/2014/main" id="{85149191-5F60-4A28-AAFF-039F96B0F3EC}"/>
+              </a:ext>
+              <a:ext uri="{C183D7F6-B498-43B3-948B-1728B52AA6E4}">
+                <adec:decorative xmlns:adec="http://schemas.microsoft.com/office/drawing/2017/decorative" val="1"/>
+              </a:ext>
+            </a:extLst>
+          </p:cNvPr>
+          <p:cNvSpPr>
+            <a:spLocks noGrp="1" noRot="1" noChangeAspect="1" noMove="1" noResize="1" noEditPoints="1" noAdjustHandles="1" noChangeArrowheads="1" noChangeShapeType="1" noTextEdit="1"/>
+          </p:cNvSpPr>
+          <p:nvPr>
+            <p:extLst>
+              <p:ext uri="{386F3935-93C4-4BCD-93E2-E3B085C9AB24}">
+                <p16:designElem xmlns:p16="http://schemas.microsoft.com/office/powerpoint/2015/main" val="1"/>
+              </p:ext>
+            </p:extLst>
+          </p:nvPr>
+        </p:nvSpPr>
+        <p:spPr>
+          <a:xfrm rot="16200000" flipH="1">
+            <a:off x="-1180882" y="1638085"/>
+            <a:ext cx="6857572" cy="3581401"/>
+          </a:xfrm>
+          <a:prstGeom prst="rect">
+            <a:avLst/>
+          </a:prstGeom>
+          <a:gradFill>
+            <a:gsLst>
+              <a:gs pos="0">
+                <a:srgbClr val="000000">
+                  <a:alpha val="59000"/>
+                </a:srgbClr>
+              </a:gs>
+              <a:gs pos="69000">
+                <a:schemeClr val="accent1">
+                  <a:alpha val="0"/>
+                </a:schemeClr>
+              </a:gs>
+            </a:gsLst>
+            <a:lin ang="13200000" scaled="0"/>
+          </a:gradFill>
+          <a:ln>
+            <a:noFill/>
+          </a:ln>
+        </p:spPr>
+        <p:style>
+          <a:lnRef idx="2">
+            <a:schemeClr val="accent1">
+              <a:shade val="50000"/>
+            </a:schemeClr>
+          </a:lnRef>
+          <a:fillRef idx="1">
+            <a:schemeClr val="accent1"/>
+          </a:fillRef>
+          <a:effectRef idx="0">
+            <a:schemeClr val="accent1"/>
+          </a:effectRef>
+          <a:fontRef idx="minor">
+            <a:schemeClr val="lt1"/>
+          </a:fontRef>
+        </p:style>
+        <p:txBody>
+          <a:bodyPr rtlCol="0" anchor="ctr"/>
+          <a:lstStyle/>
+          <a:p>
+            <a:pPr algn="ctr"/>
+            <a:endParaRPr lang="en-US" dirty="0"/>
+          </a:p>
+        </p:txBody>
+      </p:sp>
+      <p:sp>
+        <p:nvSpPr>
+          <p:cNvPr id="30" name="Freeform: Shape 29">
+            <a:extLst>
+              <a:ext uri="{FF2B5EF4-FFF2-40B4-BE49-F238E27FC236}">
+                <a16:creationId xmlns:a16="http://schemas.microsoft.com/office/drawing/2014/main" id="{F8260ED5-17F7-4158-B241-D51DD4CF1B7E}"/>
+              </a:ext>
+              <a:ext uri="{C183D7F6-B498-43B3-948B-1728B52AA6E4}">
+                <adec:decorative xmlns:adec="http://schemas.microsoft.com/office/drawing/2017/decorative" val="1"/>
+              </a:ext>
+            </a:extLst>
+          </p:cNvPr>
+          <p:cNvSpPr>
+            <a:spLocks noGrp="1" noRot="1" noChangeAspect="1" noMove="1" noResize="1" noEditPoints="1" noAdjustHandles="1" noChangeArrowheads="1" noChangeShapeType="1" noTextEdit="1"/>
+          </p:cNvSpPr>
+          <p:nvPr>
+            <p:extLst>
+              <p:ext uri="{386F3935-93C4-4BCD-93E2-E3B085C9AB24}">
+                <p16:designElem xmlns:p16="http://schemas.microsoft.com/office/powerpoint/2015/main" val="1"/>
+              </p:ext>
+            </p:extLst>
+          </p:nvPr>
+        </p:nvSpPr>
+        <p:spPr>
+          <a:xfrm rot="6097846">
+            <a:off x="-747355" y="1201312"/>
+            <a:ext cx="4808302" cy="4088666"/>
+          </a:xfrm>
+          <a:custGeom>
+            <a:avLst/>
+            <a:gdLst>
+              <a:gd name="connsiteX0" fmla="*/ 48844 w 4808302"/>
+              <a:gd name="connsiteY0" fmla="*/ 2888671 h 4088666"/>
+              <a:gd name="connsiteX1" fmla="*/ 0 w 4808302"/>
+              <a:gd name="connsiteY1" fmla="*/ 2404151 h 4088666"/>
+              <a:gd name="connsiteX2" fmla="*/ 2404151 w 4808302"/>
+              <a:gd name="connsiteY2" fmla="*/ 0 h 4088666"/>
+              <a:gd name="connsiteX3" fmla="*/ 4808302 w 4808302"/>
+              <a:gd name="connsiteY3" fmla="*/ 2404151 h 4088666"/>
+              <a:gd name="connsiteX4" fmla="*/ 4700216 w 4808302"/>
+              <a:gd name="connsiteY4" fmla="*/ 3119072 h 4088666"/>
+              <a:gd name="connsiteX5" fmla="*/ 4643143 w 4808302"/>
+              <a:gd name="connsiteY5" fmla="*/ 3275009 h 4088666"/>
+              <a:gd name="connsiteX6" fmla="*/ 690093 w 4808302"/>
+              <a:gd name="connsiteY6" fmla="*/ 4088666 h 4088666"/>
+              <a:gd name="connsiteX7" fmla="*/ 548991 w 4808302"/>
+              <a:gd name="connsiteY7" fmla="*/ 3933414 h 4088666"/>
+              <a:gd name="connsiteX8" fmla="*/ 48844 w 4808302"/>
+              <a:gd name="connsiteY8" fmla="*/ 2888671 h 4088666"/>
+            </a:gdLst>
+            <a:ahLst/>
+            <a:cxnLst>
+              <a:cxn ang="0">
+                <a:pos x="connsiteX0" y="connsiteY0"/>
+              </a:cxn>
+              <a:cxn ang="0">
+                <a:pos x="connsiteX1" y="connsiteY1"/>
+              </a:cxn>
+              <a:cxn ang="0">
+                <a:pos x="connsiteX2" y="connsiteY2"/>
+              </a:cxn>
+              <a:cxn ang="0">
+                <a:pos x="connsiteX3" y="connsiteY3"/>
+              </a:cxn>
+              <a:cxn ang="0">
+                <a:pos x="connsiteX4" y="connsiteY4"/>
+              </a:cxn>
+              <a:cxn ang="0">
+                <a:pos x="connsiteX5" y="connsiteY5"/>
+              </a:cxn>
+              <a:cxn ang="0">
+                <a:pos x="connsiteX6" y="connsiteY6"/>
+              </a:cxn>
+              <a:cxn ang="0">
+                <a:pos x="connsiteX7" y="connsiteY7"/>
+              </a:cxn>
+              <a:cxn ang="0">
+                <a:pos x="connsiteX8" y="connsiteY8"/>
+              </a:cxn>
+            </a:cxnLst>
+            <a:rect l="l" t="t" r="r" b="b"/>
+            <a:pathLst>
+              <a:path w="4808302" h="4088666">
+                <a:moveTo>
+                  <a:pt x="48844" y="2888671"/>
+                </a:moveTo>
+                <a:cubicBezTo>
+                  <a:pt x="16818" y="2732167"/>
+                  <a:pt x="0" y="2570123"/>
+                  <a:pt x="0" y="2404151"/>
+                </a:cubicBezTo>
+                <a:cubicBezTo>
+                  <a:pt x="0" y="1076375"/>
+                  <a:pt x="1076375" y="0"/>
+                  <a:pt x="2404151" y="0"/>
+                </a:cubicBezTo>
+                <a:cubicBezTo>
+                  <a:pt x="3731927" y="0"/>
+                  <a:pt x="4808302" y="1076375"/>
+                  <a:pt x="4808302" y="2404151"/>
+                </a:cubicBezTo>
+                <a:cubicBezTo>
+                  <a:pt x="4808302" y="2653109"/>
+                  <a:pt x="4770461" y="2893229"/>
+                  <a:pt x="4700216" y="3119072"/>
+                </a:cubicBezTo>
+                <a:lnTo>
+                  <a:pt x="4643143" y="3275009"/>
+                </a:lnTo>
+                <a:lnTo>
+                  <a:pt x="690093" y="4088666"/>
+                </a:lnTo>
+                <a:lnTo>
+                  <a:pt x="548991" y="3933414"/>
+                </a:lnTo>
+                <a:cubicBezTo>
+                  <a:pt x="304015" y="3636572"/>
+                  <a:pt x="128908" y="3279932"/>
+                  <a:pt x="48844" y="2888671"/>
+                </a:cubicBezTo>
+                <a:close/>
+              </a:path>
+            </a:pathLst>
+          </a:custGeom>
+          <a:gradFill>
+            <a:gsLst>
+              <a:gs pos="39000">
+                <a:schemeClr val="accent1">
+                  <a:lumMod val="60000"/>
+                  <a:lumOff val="40000"/>
+                  <a:alpha val="0"/>
+                </a:schemeClr>
+              </a:gs>
+              <a:gs pos="100000">
+                <a:schemeClr val="accent1">
+                  <a:lumMod val="75000"/>
+                  <a:alpha val="26000"/>
+                </a:schemeClr>
+              </a:gs>
+            </a:gsLst>
+            <a:lin ang="18600000" scaled="0"/>
+          </a:gradFill>
+          <a:ln>
+            <a:noFill/>
+          </a:ln>
+        </p:spPr>
+        <p:style>
+          <a:lnRef idx="2">
+            <a:schemeClr val="accent1">
+              <a:shade val="50000"/>
+            </a:schemeClr>
+          </a:lnRef>
+          <a:fillRef idx="1">
+            <a:schemeClr val="accent1"/>
+          </a:fillRef>
+          <a:effectRef idx="0">
+            <a:schemeClr val="accent1"/>
+          </a:effectRef>
+          <a:fontRef idx="minor">
+            <a:schemeClr val="lt1"/>
+          </a:fontRef>
+        </p:style>
+        <p:txBody>
+          <a:bodyPr wrap="square" rtlCol="0" anchor="ctr">
+            <a:noAutofit/>
+          </a:bodyPr>
+          <a:lstStyle/>
+          <a:p>
+            <a:pPr algn="ctr"/>
+            <a:endParaRPr lang="en-US" dirty="0"/>
+          </a:p>
+        </p:txBody>
+      </p:sp>
+      <p:sp>
+        <p:nvSpPr>
+          <p:cNvPr id="2" name="Cím 1">
+            <a:extLst>
+              <a:ext uri="{FF2B5EF4-FFF2-40B4-BE49-F238E27FC236}">
+                <a16:creationId xmlns:a16="http://schemas.microsoft.com/office/drawing/2014/main" id="{B2A0928F-D58D-4CF1-9C6C-0CB712D7A6B9}"/>
+              </a:ext>
+            </a:extLst>
+          </p:cNvPr>
+          <p:cNvSpPr>
+            <a:spLocks noGrp="1"/>
+          </p:cNvSpPr>
+          <p:nvPr>
+            <p:ph type="ctrTitle"/>
+          </p:nvPr>
+        </p:nvSpPr>
+        <p:spPr>
+          <a:xfrm>
+            <a:off x="455066" y="2363582"/>
+            <a:ext cx="3280472" cy="2130406"/>
+          </a:xfrm>
+        </p:spPr>
+        <p:txBody>
+          <a:bodyPr anchor="t">
+            <a:normAutofit/>
+          </a:bodyPr>
+          <a:lstStyle/>
+          <a:p>
+            <a:pPr algn="l"/>
+            <a:endParaRPr lang="hu-HU" sz="2000" dirty="0">
+              <a:solidFill>
+                <a:srgbClr val="FFFFFF"/>
+              </a:solidFill>
+            </a:endParaRPr>
+          </a:p>
+        </p:txBody>
+      </p:sp>
+      <p:sp>
+        <p:nvSpPr>
+          <p:cNvPr id="3" name="Alcím 2">
+            <a:extLst>
+              <a:ext uri="{FF2B5EF4-FFF2-40B4-BE49-F238E27FC236}">
+                <a16:creationId xmlns:a16="http://schemas.microsoft.com/office/drawing/2014/main" id="{9C9AE997-4508-48BB-8A35-FB9009EFD7B5}"/>
+              </a:ext>
+            </a:extLst>
+          </p:cNvPr>
+          <p:cNvSpPr>
+            <a:spLocks noGrp="1"/>
+          </p:cNvSpPr>
+          <p:nvPr>
+            <p:ph type="subTitle" idx="1"/>
+          </p:nvPr>
+        </p:nvSpPr>
+        <p:spPr>
+          <a:xfrm>
+            <a:off x="660042" y="806825"/>
+            <a:ext cx="2919738" cy="408022"/>
+          </a:xfrm>
+        </p:spPr>
+        <p:txBody>
+          <a:bodyPr anchor="b">
+            <a:noAutofit/>
+          </a:bodyPr>
+          <a:lstStyle/>
+          <a:p>
+            <a:r>
+              <a:rPr lang="hu-HU" sz="3200" dirty="0">
+                <a:solidFill>
+                  <a:srgbClr val="FFFFFF"/>
+                </a:solidFill>
+              </a:rPr>
+              <a:t>És az exportált PDF így néz ki:</a:t>
+            </a:r>
+          </a:p>
+        </p:txBody>
+      </p:sp>
+      <p:pic>
+        <p:nvPicPr>
+          <p:cNvPr id="6" name="Kép 5">
+            <a:extLst>
+              <a:ext uri="{FF2B5EF4-FFF2-40B4-BE49-F238E27FC236}">
+                <a16:creationId xmlns:a16="http://schemas.microsoft.com/office/drawing/2014/main" id="{A5E6F843-5C3C-48EB-95C8-CFC56381E962}"/>
+              </a:ext>
+            </a:extLst>
+          </p:cNvPr>
+          <p:cNvPicPr>
+            <a:picLocks noChangeAspect="1"/>
+          </p:cNvPicPr>
+          <p:nvPr/>
+        </p:nvPicPr>
+        <p:blipFill>
+          <a:blip r:embed="rId2"/>
+          <a:stretch>
+            <a:fillRect/>
+          </a:stretch>
+        </p:blipFill>
+        <p:spPr>
+          <a:xfrm>
+            <a:off x="4172420" y="999273"/>
+            <a:ext cx="7991000" cy="4492744"/>
+          </a:xfrm>
+          <a:prstGeom prst="rect">
+            <a:avLst/>
+          </a:prstGeom>
+        </p:spPr>
+      </p:pic>
+    </p:spTree>
+    <p:extLst>
+      <p:ext uri="{BB962C8B-B14F-4D97-AF65-F5344CB8AC3E}">
+        <p14:creationId xmlns:p14="http://schemas.microsoft.com/office/powerpoint/2010/main" val="2813832751"/>
+      </p:ext>
+    </p:extLst>
+  </p:cSld>
+  <p:clrMapOvr>
+    <a:masterClrMapping/>
+  </p:clrMapOvr>
+  <p:timing>
+    <p:tnLst>
+      <p:par>
+        <p:cTn id="1" dur="indefinite" restart="never" nodeType="tmRoot">
+          <p:childTnLst>
+            <p:seq concurrent="1" nextAc="seek">
+              <p:cTn id="2" dur="indefinite" nodeType="mainSeq">
+                <p:childTnLst>
+                  <p:par>
+                    <p:cTn id="3" fill="hold">
+                      <p:stCondLst>
+                        <p:cond delay="indefinite"/>
+                        <p:cond evt="onBegin" delay="0">
+                          <p:tn val="2"/>
+                        </p:cond>
+                      </p:stCondLst>
+                      <p:childTnLst>
+                        <p:par>
+                          <p:cTn id="4" fill="hold">
+                            <p:stCondLst>
+                              <p:cond delay="0"/>
+                            </p:stCondLst>
+                            <p:childTnLst>
+                              <p:par>
+                                <p:cTn id="5" presetID="10" presetClass="entr" presetSubtype="0" fill="hold" grpId="0" nodeType="withEffect">
+                                  <p:stCondLst>
+                                    <p:cond delay="1500"/>
+                                  </p:stCondLst>
+                                  <p:iterate>
+                                    <p:tmPct val="10000"/>
+                                  </p:iterate>
+                                  <p:childTnLst>
+                                    <p:set>
+                                      <p:cBhvr>
+                                        <p:cTn id="6" dur="1" fill="hold">
+                                          <p:stCondLst>
+                                            <p:cond delay="0"/>
+                                          </p:stCondLst>
+                                        </p:cTn>
+                                        <p:tgtEl>
+                                          <p:spTgt spid="3">
+                                            <p:txEl>
+                                              <p:pRg st="0" end="0"/>
+                                            </p:txEl>
+                                          </p:spTgt>
+                                        </p:tgtEl>
+                                        <p:attrNameLst>
+                                          <p:attrName>style.visibility</p:attrName>
+                                        </p:attrNameLst>
+                                      </p:cBhvr>
+                                      <p:to>
+                                        <p:strVal val="visible"/>
+                                      </p:to>
+                                    </p:set>
+                                    <p:animEffect transition="in" filter="fade">
+                                      <p:cBhvr>
+                                        <p:cTn id="7" dur="700"/>
+                                        <p:tgtEl>
+                                          <p:spTgt spid="3">
+                                            <p:txEl>
+                                              <p:pRg st="0" end="0"/>
+                                            </p:txEl>
+                                          </p:spTgt>
+                                        </p:tgtEl>
+                                      </p:cBhvr>
+                                    </p:animEffect>
+                                  </p:childTnLst>
+                                </p:cTn>
+                              </p:par>
+                            </p:childTnLst>
+                          </p:cTn>
+                        </p:par>
+                      </p:childTnLst>
+                    </p:cTn>
+                  </p:par>
+                </p:childTnLst>
+              </p:cTn>
+              <p:prevCondLst>
+                <p:cond evt="onPrev" delay="0">
+                  <p:tgtEl>
+                    <p:sldTgt/>
+                  </p:tgtEl>
+                </p:cond>
+              </p:prevCondLst>
+              <p:nextCondLst>
+                <p:cond evt="onNext" delay="0">
+                  <p:tgtEl>
+                    <p:sldTgt/>
+                  </p:tgtEl>
+                </p:cond>
+              </p:nextCondLst>
+            </p:seq>
+          </p:childTnLst>
+        </p:cTn>
+      </p:par>
+    </p:tnLst>
+    <p:bldLst>
+      <p:bldP spid="3" grpId="0" build="p"/>
+    </p:bldLst>
+  </p:timing>
+</p:sld>
+</file>
+
+<file path=ppt/slides/slide9.xml><?xml version="1.0" encoding="utf-8"?>
 <p:sld xmlns:a="http://schemas.openxmlformats.org/drawingml/2006/main" xmlns:r="http://schemas.openxmlformats.org/officeDocument/2006/relationships" xmlns:p="http://schemas.openxmlformats.org/presentationml/2006/main">
   <p:cSld>
     <p:bg>
@@ -10809,656 +11435,6 @@
       <p:bldP spid="18" grpId="0"/>
     </p:bldLst>
   </p:timing>
-</p:sld>
-</file>
-
-<file path=ppt/slides/slide9.xml><?xml version="1.0" encoding="utf-8"?>
-<p:sld xmlns:a="http://schemas.openxmlformats.org/drawingml/2006/main" xmlns:r="http://schemas.openxmlformats.org/officeDocument/2006/relationships" xmlns:p="http://schemas.openxmlformats.org/presentationml/2006/main">
-  <p:cSld>
-    <p:bg>
-      <p:bgPr>
-        <a:solidFill>
-          <a:schemeClr val="bg1"/>
-        </a:solidFill>
-        <a:effectLst/>
-      </p:bgPr>
-    </p:bg>
-    <p:spTree>
-      <p:nvGrpSpPr>
-        <p:cNvPr id="1" name=""/>
-        <p:cNvGrpSpPr/>
-        <p:nvPr/>
-      </p:nvGrpSpPr>
-      <p:grpSpPr>
-        <a:xfrm>
-          <a:off x="0" y="0"/>
-          <a:ext cx="0" cy="0"/>
-          <a:chOff x="0" y="0"/>
-          <a:chExt cx="0" cy="0"/>
-        </a:xfrm>
-      </p:grpSpPr>
-      <p:sp useBgFill="1">
-        <p:nvSpPr>
-          <p:cNvPr id="10" name="Rectangle 9">
-            <a:extLst>
-              <a:ext uri="{FF2B5EF4-FFF2-40B4-BE49-F238E27FC236}">
-                <a16:creationId xmlns:a16="http://schemas.microsoft.com/office/drawing/2014/main" id="{A8384FB5-9ADC-4DDC-881B-597D56F5B15D}"/>
-              </a:ext>
-              <a:ext uri="{C183D7F6-B498-43B3-948B-1728B52AA6E4}">
-                <adec:decorative xmlns:adec="http://schemas.microsoft.com/office/drawing/2017/decorative" val="1"/>
-              </a:ext>
-            </a:extLst>
-          </p:cNvPr>
-          <p:cNvSpPr>
-            <a:spLocks noGrp="1" noRot="1" noChangeAspect="1" noMove="1" noResize="1" noEditPoints="1" noAdjustHandles="1" noChangeArrowheads="1" noChangeShapeType="1" noTextEdit="1"/>
-          </p:cNvSpPr>
-          <p:nvPr>
-            <p:extLst>
-              <p:ext uri="{386F3935-93C4-4BCD-93E2-E3B085C9AB24}">
-                <p16:designElem xmlns:p16="http://schemas.microsoft.com/office/powerpoint/2015/main" val="1"/>
-              </p:ext>
-            </p:extLst>
-          </p:nvPr>
-        </p:nvSpPr>
-        <p:spPr>
-          <a:xfrm>
-            <a:off x="0" y="0"/>
-            <a:ext cx="12192000" cy="6858000"/>
-          </a:xfrm>
-          <a:prstGeom prst="rect">
-            <a:avLst/>
-          </a:prstGeom>
-          <a:ln w="12700" cap="flat" cmpd="sng" algn="ctr">
-            <a:noFill/>
-            <a:prstDash val="solid"/>
-            <a:miter lim="800000"/>
-          </a:ln>
-          <a:effectLst/>
-          <a:extLst>
-            <a:ext uri="{91240B29-F687-4F45-9708-019B960494DF}">
-              <a14:hiddenLine xmlns:a14="http://schemas.microsoft.com/office/drawing/2010/main" w="12700" cap="flat" cmpd="sng" algn="ctr">
-                <a:solidFill>
-                  <a:schemeClr val="accent1">
-                    <a:shade val="50000"/>
-                  </a:schemeClr>
-                </a:solidFill>
-                <a:prstDash val="solid"/>
-                <a:miter lim="800000"/>
-              </a14:hiddenLine>
-            </a:ext>
-          </a:extLst>
-        </p:spPr>
-        <p:style>
-          <a:lnRef idx="2">
-            <a:schemeClr val="accent1">
-              <a:shade val="50000"/>
-            </a:schemeClr>
-          </a:lnRef>
-          <a:fillRef idx="1">
-            <a:schemeClr val="accent1"/>
-          </a:fillRef>
-          <a:effectRef idx="0">
-            <a:schemeClr val="accent1"/>
-          </a:effectRef>
-          <a:fontRef idx="minor">
-            <a:schemeClr val="lt1"/>
-          </a:fontRef>
-        </p:style>
-        <p:txBody>
-          <a:bodyPr rtlCol="0" anchor="ctr"/>
-          <a:lstStyle/>
-          <a:p>
-            <a:pPr algn="ctr"/>
-            <a:endParaRPr lang="en-US"/>
-          </a:p>
-        </p:txBody>
-      </p:sp>
-      <p:sp>
-        <p:nvSpPr>
-          <p:cNvPr id="12" name="Rectangle 11">
-            <a:extLst>
-              <a:ext uri="{FF2B5EF4-FFF2-40B4-BE49-F238E27FC236}">
-                <a16:creationId xmlns:a16="http://schemas.microsoft.com/office/drawing/2014/main" id="{91E5A9A7-95C6-4F4F-B00E-C82E07FE62EF}"/>
-              </a:ext>
-              <a:ext uri="{C183D7F6-B498-43B3-948B-1728B52AA6E4}">
-                <adec:decorative xmlns:adec="http://schemas.microsoft.com/office/drawing/2017/decorative" val="1"/>
-              </a:ext>
-            </a:extLst>
-          </p:cNvPr>
-          <p:cNvSpPr>
-            <a:spLocks noGrp="1" noRot="1" noChangeAspect="1" noMove="1" noResize="1" noEditPoints="1" noAdjustHandles="1" noChangeArrowheads="1" noChangeShapeType="1" noTextEdit="1"/>
-          </p:cNvSpPr>
-          <p:nvPr>
-            <p:extLst>
-              <p:ext uri="{386F3935-93C4-4BCD-93E2-E3B085C9AB24}">
-                <p16:designElem xmlns:p16="http://schemas.microsoft.com/office/powerpoint/2015/main" val="1"/>
-              </p:ext>
-            </p:extLst>
-          </p:nvPr>
-        </p:nvSpPr>
-        <p:spPr>
-          <a:xfrm rot="5400000" flipH="1">
-            <a:off x="-1417539" y="1417538"/>
-            <a:ext cx="6875818" cy="4040744"/>
-          </a:xfrm>
-          <a:prstGeom prst="rect">
-            <a:avLst/>
-          </a:prstGeom>
-          <a:gradFill>
-            <a:gsLst>
-              <a:gs pos="0">
-                <a:srgbClr val="000000"/>
-              </a:gs>
-              <a:gs pos="100000">
-                <a:schemeClr val="accent1">
-                  <a:lumMod val="75000"/>
-                </a:schemeClr>
-              </a:gs>
-            </a:gsLst>
-            <a:lin ang="18600000" scaled="0"/>
-          </a:gradFill>
-          <a:ln>
-            <a:noFill/>
-          </a:ln>
-        </p:spPr>
-        <p:style>
-          <a:lnRef idx="2">
-            <a:schemeClr val="accent1">
-              <a:shade val="50000"/>
-            </a:schemeClr>
-          </a:lnRef>
-          <a:fillRef idx="1">
-            <a:schemeClr val="accent1"/>
-          </a:fillRef>
-          <a:effectRef idx="0">
-            <a:schemeClr val="accent1"/>
-          </a:effectRef>
-          <a:fontRef idx="minor">
-            <a:schemeClr val="lt1"/>
-          </a:fontRef>
-        </p:style>
-        <p:txBody>
-          <a:bodyPr rtlCol="0" anchor="ctr"/>
-          <a:lstStyle/>
-          <a:p>
-            <a:pPr algn="ctr"/>
-            <a:endParaRPr lang="en-US" dirty="0"/>
-          </a:p>
-        </p:txBody>
-      </p:sp>
-      <p:sp>
-        <p:nvSpPr>
-          <p:cNvPr id="14" name="Rectangle 13">
-            <a:extLst>
-              <a:ext uri="{FF2B5EF4-FFF2-40B4-BE49-F238E27FC236}">
-                <a16:creationId xmlns:a16="http://schemas.microsoft.com/office/drawing/2014/main" id="{D07DD2DE-F619-49DD-B5E7-03A290FF4ED1}"/>
-              </a:ext>
-              <a:ext uri="{C183D7F6-B498-43B3-948B-1728B52AA6E4}">
-                <adec:decorative xmlns:adec="http://schemas.microsoft.com/office/drawing/2017/decorative" val="1"/>
-              </a:ext>
-            </a:extLst>
-          </p:cNvPr>
-          <p:cNvSpPr>
-            <a:spLocks noGrp="1" noRot="1" noChangeAspect="1" noMove="1" noResize="1" noEditPoints="1" noAdjustHandles="1" noChangeArrowheads="1" noChangeShapeType="1" noTextEdit="1"/>
-          </p:cNvSpPr>
-          <p:nvPr>
-            <p:extLst>
-              <p:ext uri="{386F3935-93C4-4BCD-93E2-E3B085C9AB24}">
-                <p16:designElem xmlns:p16="http://schemas.microsoft.com/office/powerpoint/2015/main" val="1"/>
-              </p:ext>
-            </p:extLst>
-          </p:nvPr>
-        </p:nvSpPr>
-        <p:spPr>
-          <a:xfrm rot="16200000">
-            <a:off x="-158495" y="2660473"/>
-            <a:ext cx="4355594" cy="4038603"/>
-          </a:xfrm>
-          <a:prstGeom prst="rect">
-            <a:avLst/>
-          </a:prstGeom>
-          <a:gradFill>
-            <a:gsLst>
-              <a:gs pos="0">
-                <a:schemeClr val="accent1">
-                  <a:alpha val="50000"/>
-                </a:schemeClr>
-              </a:gs>
-              <a:gs pos="100000">
-                <a:schemeClr val="accent1">
-                  <a:lumMod val="50000"/>
-                  <a:alpha val="0"/>
-                </a:schemeClr>
-              </a:gs>
-            </a:gsLst>
-            <a:lin ang="11400000" scaled="0"/>
-          </a:gradFill>
-          <a:ln>
-            <a:noFill/>
-          </a:ln>
-        </p:spPr>
-        <p:style>
-          <a:lnRef idx="2">
-            <a:schemeClr val="accent1">
-              <a:shade val="50000"/>
-            </a:schemeClr>
-          </a:lnRef>
-          <a:fillRef idx="1">
-            <a:schemeClr val="accent1"/>
-          </a:fillRef>
-          <a:effectRef idx="0">
-            <a:schemeClr val="accent1"/>
-          </a:effectRef>
-          <a:fontRef idx="minor">
-            <a:schemeClr val="lt1"/>
-          </a:fontRef>
-        </p:style>
-        <p:txBody>
-          <a:bodyPr rtlCol="0" anchor="ctr"/>
-          <a:lstStyle/>
-          <a:p>
-            <a:pPr algn="ctr"/>
-            <a:endParaRPr lang="en-US"/>
-          </a:p>
-        </p:txBody>
-      </p:sp>
-      <p:sp>
-        <p:nvSpPr>
-          <p:cNvPr id="16" name="Rectangle 15">
-            <a:extLst>
-              <a:ext uri="{FF2B5EF4-FFF2-40B4-BE49-F238E27FC236}">
-                <a16:creationId xmlns:a16="http://schemas.microsoft.com/office/drawing/2014/main" id="{85149191-5F60-4A28-AAFF-039F96B0F3EC}"/>
-              </a:ext>
-              <a:ext uri="{C183D7F6-B498-43B3-948B-1728B52AA6E4}">
-                <adec:decorative xmlns:adec="http://schemas.microsoft.com/office/drawing/2017/decorative" val="1"/>
-              </a:ext>
-            </a:extLst>
-          </p:cNvPr>
-          <p:cNvSpPr>
-            <a:spLocks noGrp="1" noRot="1" noChangeAspect="1" noMove="1" noResize="1" noEditPoints="1" noAdjustHandles="1" noChangeArrowheads="1" noChangeShapeType="1" noTextEdit="1"/>
-          </p:cNvSpPr>
-          <p:nvPr>
-            <p:extLst>
-              <p:ext uri="{386F3935-93C4-4BCD-93E2-E3B085C9AB24}">
-                <p16:designElem xmlns:p16="http://schemas.microsoft.com/office/powerpoint/2015/main" val="1"/>
-              </p:ext>
-            </p:extLst>
-          </p:nvPr>
-        </p:nvSpPr>
-        <p:spPr>
-          <a:xfrm rot="16200000" flipH="1">
-            <a:off x="-1180882" y="1638085"/>
-            <a:ext cx="6857572" cy="3581401"/>
-          </a:xfrm>
-          <a:prstGeom prst="rect">
-            <a:avLst/>
-          </a:prstGeom>
-          <a:gradFill>
-            <a:gsLst>
-              <a:gs pos="0">
-                <a:srgbClr val="000000">
-                  <a:alpha val="59000"/>
-                </a:srgbClr>
-              </a:gs>
-              <a:gs pos="69000">
-                <a:schemeClr val="accent1">
-                  <a:alpha val="0"/>
-                </a:schemeClr>
-              </a:gs>
-            </a:gsLst>
-            <a:lin ang="13200000" scaled="0"/>
-          </a:gradFill>
-          <a:ln>
-            <a:noFill/>
-          </a:ln>
-        </p:spPr>
-        <p:style>
-          <a:lnRef idx="2">
-            <a:schemeClr val="accent1">
-              <a:shade val="50000"/>
-            </a:schemeClr>
-          </a:lnRef>
-          <a:fillRef idx="1">
-            <a:schemeClr val="accent1"/>
-          </a:fillRef>
-          <a:effectRef idx="0">
-            <a:schemeClr val="accent1"/>
-          </a:effectRef>
-          <a:fontRef idx="minor">
-            <a:schemeClr val="lt1"/>
-          </a:fontRef>
-        </p:style>
-        <p:txBody>
-          <a:bodyPr rtlCol="0" anchor="ctr"/>
-          <a:lstStyle/>
-          <a:p>
-            <a:pPr algn="ctr"/>
-            <a:endParaRPr lang="en-US" dirty="0"/>
-          </a:p>
-        </p:txBody>
-      </p:sp>
-      <p:sp>
-        <p:nvSpPr>
-          <p:cNvPr id="18" name="Freeform: Shape 17">
-            <a:extLst>
-              <a:ext uri="{FF2B5EF4-FFF2-40B4-BE49-F238E27FC236}">
-                <a16:creationId xmlns:a16="http://schemas.microsoft.com/office/drawing/2014/main" id="{F8260ED5-17F7-4158-B241-D51DD4CF1B7E}"/>
-              </a:ext>
-              <a:ext uri="{C183D7F6-B498-43B3-948B-1728B52AA6E4}">
-                <adec:decorative xmlns:adec="http://schemas.microsoft.com/office/drawing/2017/decorative" val="1"/>
-              </a:ext>
-            </a:extLst>
-          </p:cNvPr>
-          <p:cNvSpPr>
-            <a:spLocks noGrp="1" noRot="1" noChangeAspect="1" noMove="1" noResize="1" noEditPoints="1" noAdjustHandles="1" noChangeArrowheads="1" noChangeShapeType="1" noTextEdit="1"/>
-          </p:cNvSpPr>
-          <p:nvPr>
-            <p:extLst>
-              <p:ext uri="{386F3935-93C4-4BCD-93E2-E3B085C9AB24}">
-                <p16:designElem xmlns:p16="http://schemas.microsoft.com/office/powerpoint/2015/main" val="1"/>
-              </p:ext>
-            </p:extLst>
-          </p:nvPr>
-        </p:nvSpPr>
-        <p:spPr>
-          <a:xfrm rot="6097846">
-            <a:off x="-747355" y="1201312"/>
-            <a:ext cx="4808302" cy="4088666"/>
-          </a:xfrm>
-          <a:custGeom>
-            <a:avLst/>
-            <a:gdLst>
-              <a:gd name="connsiteX0" fmla="*/ 48844 w 4808302"/>
-              <a:gd name="connsiteY0" fmla="*/ 2888671 h 4088666"/>
-              <a:gd name="connsiteX1" fmla="*/ 0 w 4808302"/>
-              <a:gd name="connsiteY1" fmla="*/ 2404151 h 4088666"/>
-              <a:gd name="connsiteX2" fmla="*/ 2404151 w 4808302"/>
-              <a:gd name="connsiteY2" fmla="*/ 0 h 4088666"/>
-              <a:gd name="connsiteX3" fmla="*/ 4808302 w 4808302"/>
-              <a:gd name="connsiteY3" fmla="*/ 2404151 h 4088666"/>
-              <a:gd name="connsiteX4" fmla="*/ 4700216 w 4808302"/>
-              <a:gd name="connsiteY4" fmla="*/ 3119072 h 4088666"/>
-              <a:gd name="connsiteX5" fmla="*/ 4643143 w 4808302"/>
-              <a:gd name="connsiteY5" fmla="*/ 3275009 h 4088666"/>
-              <a:gd name="connsiteX6" fmla="*/ 690093 w 4808302"/>
-              <a:gd name="connsiteY6" fmla="*/ 4088666 h 4088666"/>
-              <a:gd name="connsiteX7" fmla="*/ 548991 w 4808302"/>
-              <a:gd name="connsiteY7" fmla="*/ 3933414 h 4088666"/>
-              <a:gd name="connsiteX8" fmla="*/ 48844 w 4808302"/>
-              <a:gd name="connsiteY8" fmla="*/ 2888671 h 4088666"/>
-            </a:gdLst>
-            <a:ahLst/>
-            <a:cxnLst>
-              <a:cxn ang="0">
-                <a:pos x="connsiteX0" y="connsiteY0"/>
-              </a:cxn>
-              <a:cxn ang="0">
-                <a:pos x="connsiteX1" y="connsiteY1"/>
-              </a:cxn>
-              <a:cxn ang="0">
-                <a:pos x="connsiteX2" y="connsiteY2"/>
-              </a:cxn>
-              <a:cxn ang="0">
-                <a:pos x="connsiteX3" y="connsiteY3"/>
-              </a:cxn>
-              <a:cxn ang="0">
-                <a:pos x="connsiteX4" y="connsiteY4"/>
-              </a:cxn>
-              <a:cxn ang="0">
-                <a:pos x="connsiteX5" y="connsiteY5"/>
-              </a:cxn>
-              <a:cxn ang="0">
-                <a:pos x="connsiteX6" y="connsiteY6"/>
-              </a:cxn>
-              <a:cxn ang="0">
-                <a:pos x="connsiteX7" y="connsiteY7"/>
-              </a:cxn>
-              <a:cxn ang="0">
-                <a:pos x="connsiteX8" y="connsiteY8"/>
-              </a:cxn>
-            </a:cxnLst>
-            <a:rect l="l" t="t" r="r" b="b"/>
-            <a:pathLst>
-              <a:path w="4808302" h="4088666">
-                <a:moveTo>
-                  <a:pt x="48844" y="2888671"/>
-                </a:moveTo>
-                <a:cubicBezTo>
-                  <a:pt x="16818" y="2732167"/>
-                  <a:pt x="0" y="2570123"/>
-                  <a:pt x="0" y="2404151"/>
-                </a:cubicBezTo>
-                <a:cubicBezTo>
-                  <a:pt x="0" y="1076375"/>
-                  <a:pt x="1076375" y="0"/>
-                  <a:pt x="2404151" y="0"/>
-                </a:cubicBezTo>
-                <a:cubicBezTo>
-                  <a:pt x="3731927" y="0"/>
-                  <a:pt x="4808302" y="1076375"/>
-                  <a:pt x="4808302" y="2404151"/>
-                </a:cubicBezTo>
-                <a:cubicBezTo>
-                  <a:pt x="4808302" y="2653109"/>
-                  <a:pt x="4770461" y="2893229"/>
-                  <a:pt x="4700216" y="3119072"/>
-                </a:cubicBezTo>
-                <a:lnTo>
-                  <a:pt x="4643143" y="3275009"/>
-                </a:lnTo>
-                <a:lnTo>
-                  <a:pt x="690093" y="4088666"/>
-                </a:lnTo>
-                <a:lnTo>
-                  <a:pt x="548991" y="3933414"/>
-                </a:lnTo>
-                <a:cubicBezTo>
-                  <a:pt x="304015" y="3636572"/>
-                  <a:pt x="128908" y="3279932"/>
-                  <a:pt x="48844" y="2888671"/>
-                </a:cubicBezTo>
-                <a:close/>
-              </a:path>
-            </a:pathLst>
-          </a:custGeom>
-          <a:gradFill>
-            <a:gsLst>
-              <a:gs pos="39000">
-                <a:schemeClr val="accent1">
-                  <a:lumMod val="60000"/>
-                  <a:lumOff val="40000"/>
-                  <a:alpha val="0"/>
-                </a:schemeClr>
-              </a:gs>
-              <a:gs pos="100000">
-                <a:schemeClr val="accent1">
-                  <a:lumMod val="75000"/>
-                  <a:alpha val="26000"/>
-                </a:schemeClr>
-              </a:gs>
-            </a:gsLst>
-            <a:lin ang="18600000" scaled="0"/>
-          </a:gradFill>
-          <a:ln>
-            <a:noFill/>
-          </a:ln>
-        </p:spPr>
-        <p:style>
-          <a:lnRef idx="2">
-            <a:schemeClr val="accent1">
-              <a:shade val="50000"/>
-            </a:schemeClr>
-          </a:lnRef>
-          <a:fillRef idx="1">
-            <a:schemeClr val="accent1"/>
-          </a:fillRef>
-          <a:effectRef idx="0">
-            <a:schemeClr val="accent1"/>
-          </a:effectRef>
-          <a:fontRef idx="minor">
-            <a:schemeClr val="lt1"/>
-          </a:fontRef>
-        </p:style>
-        <p:txBody>
-          <a:bodyPr wrap="square" rtlCol="0" anchor="ctr">
-            <a:noAutofit/>
-          </a:bodyPr>
-          <a:lstStyle/>
-          <a:p>
-            <a:pPr algn="ctr"/>
-            <a:endParaRPr lang="en-US" dirty="0"/>
-          </a:p>
-        </p:txBody>
-      </p:sp>
-      <p:sp>
-        <p:nvSpPr>
-          <p:cNvPr id="2" name="Cím 1">
-            <a:extLst>
-              <a:ext uri="{FF2B5EF4-FFF2-40B4-BE49-F238E27FC236}">
-                <a16:creationId xmlns:a16="http://schemas.microsoft.com/office/drawing/2014/main" id="{B2A0928F-D58D-4CF1-9C6C-0CB712D7A6B9}"/>
-              </a:ext>
-            </a:extLst>
-          </p:cNvPr>
-          <p:cNvSpPr>
-            <a:spLocks noGrp="1"/>
-          </p:cNvSpPr>
-          <p:nvPr>
-            <p:ph type="ctrTitle"/>
-          </p:nvPr>
-        </p:nvSpPr>
-        <p:spPr>
-          <a:xfrm>
-            <a:off x="660041" y="1325489"/>
-            <a:ext cx="2880828" cy="4513523"/>
-          </a:xfrm>
-        </p:spPr>
-        <p:txBody>
-          <a:bodyPr anchor="t">
-            <a:normAutofit/>
-          </a:bodyPr>
-          <a:lstStyle/>
-          <a:p>
-            <a:pPr algn="l"/>
-            <a:r>
-              <a:rPr lang="hu-HU" sz="2000" dirty="0">
-                <a:solidFill>
-                  <a:srgbClr val="FFFFFF"/>
-                </a:solidFill>
-              </a:rPr>
-              <a:t>A program nem teljesen harmonikus megjelenésre (pl. színek). Ez annak köszönhető, hogy fejlesztés elsődleges célja a stabilitás volt.</a:t>
-            </a:r>
-          </a:p>
-        </p:txBody>
-      </p:sp>
-      <p:sp>
-        <p:nvSpPr>
-          <p:cNvPr id="3" name="Alcím 2">
-            <a:extLst>
-              <a:ext uri="{FF2B5EF4-FFF2-40B4-BE49-F238E27FC236}">
-                <a16:creationId xmlns:a16="http://schemas.microsoft.com/office/drawing/2014/main" id="{9C9AE997-4508-48BB-8A35-FB9009EFD7B5}"/>
-              </a:ext>
-            </a:extLst>
-          </p:cNvPr>
-          <p:cNvSpPr>
-            <a:spLocks noGrp="1"/>
-          </p:cNvSpPr>
-          <p:nvPr>
-            <p:ph type="subTitle" idx="1"/>
-          </p:nvPr>
-        </p:nvSpPr>
-        <p:spPr>
-          <a:xfrm>
-            <a:off x="640586" y="306501"/>
-            <a:ext cx="2919738" cy="712487"/>
-          </a:xfrm>
-        </p:spPr>
-        <p:txBody>
-          <a:bodyPr anchor="b">
-            <a:normAutofit/>
-          </a:bodyPr>
-          <a:lstStyle/>
-          <a:p>
-            <a:r>
-              <a:rPr lang="hu-HU" sz="4400" dirty="0">
-                <a:solidFill>
-                  <a:srgbClr val="FFFFFF"/>
-                </a:solidFill>
-              </a:rPr>
-              <a:t>Design</a:t>
-            </a:r>
-          </a:p>
-        </p:txBody>
-      </p:sp>
-      <p:pic>
-        <p:nvPicPr>
-          <p:cNvPr id="5" name="Kép 4">
-            <a:extLst>
-              <a:ext uri="{FF2B5EF4-FFF2-40B4-BE49-F238E27FC236}">
-                <a16:creationId xmlns:a16="http://schemas.microsoft.com/office/drawing/2014/main" id="{CFC2D399-5379-465D-9EED-480122B34835}"/>
-              </a:ext>
-            </a:extLst>
-          </p:cNvPr>
-          <p:cNvPicPr>
-            <a:picLocks noChangeAspect="1"/>
-          </p:cNvPicPr>
-          <p:nvPr/>
-        </p:nvPicPr>
-        <p:blipFill>
-          <a:blip r:embed="rId2"/>
-          <a:stretch>
-            <a:fillRect/>
-          </a:stretch>
-        </p:blipFill>
-        <p:spPr>
-          <a:xfrm>
-            <a:off x="4221987" y="306501"/>
-            <a:ext cx="5375711" cy="3538065"/>
-          </a:xfrm>
-          <a:prstGeom prst="rect">
-            <a:avLst/>
-          </a:prstGeom>
-        </p:spPr>
-      </p:pic>
-      <p:pic>
-        <p:nvPicPr>
-          <p:cNvPr id="7" name="Kép 6">
-            <a:extLst>
-              <a:ext uri="{FF2B5EF4-FFF2-40B4-BE49-F238E27FC236}">
-                <a16:creationId xmlns:a16="http://schemas.microsoft.com/office/drawing/2014/main" id="{7BCEE858-D66A-4825-ADA0-3F0F3680E17E}"/>
-              </a:ext>
-            </a:extLst>
-          </p:cNvPr>
-          <p:cNvPicPr>
-            <a:picLocks noChangeAspect="1"/>
-          </p:cNvPicPr>
-          <p:nvPr/>
-        </p:nvPicPr>
-        <p:blipFill>
-          <a:blip r:embed="rId3"/>
-          <a:stretch>
-            <a:fillRect/>
-          </a:stretch>
-        </p:blipFill>
-        <p:spPr>
-          <a:xfrm>
-            <a:off x="6680544" y="3151979"/>
-            <a:ext cx="5165207" cy="3399520"/>
-          </a:xfrm>
-          <a:prstGeom prst="rect">
-            <a:avLst/>
-          </a:prstGeom>
-        </p:spPr>
-      </p:pic>
-    </p:spTree>
-    <p:extLst>
-      <p:ext uri="{BB962C8B-B14F-4D97-AF65-F5344CB8AC3E}">
-        <p14:creationId xmlns:p14="http://schemas.microsoft.com/office/powerpoint/2010/main" val="1968849174"/>
-      </p:ext>
-    </p:extLst>
-  </p:cSld>
-  <p:clrMapOvr>
-    <a:masterClrMapping/>
-  </p:clrMapOvr>
 </p:sld>
 </file>
 

</xml_diff>

<commit_message>
Update 3 on ppt2
</commit_message>
<xml_diff>
--- a/SFM_Projekt_Áttekintés_2.pptx
+++ b/SFM_Projekt_Áttekintés_2.pptx
@@ -15,6 +15,7 @@
     <p:sldId id="273" r:id="rId9"/>
     <p:sldId id="268" r:id="rId10"/>
     <p:sldId id="260" r:id="rId11"/>
+    <p:sldId id="274" r:id="rId12"/>
   </p:sldIdLst>
   <p:sldSz cx="12192000" cy="6858000"/>
   <p:notesSz cx="6858000" cy="9144000"/>
@@ -119,6 +120,222 @@
     </p:ext>
   </p:extLst>
 </p:presentation>
+</file>
+
+<file path=ppt/ink/ink1.xml><?xml version="1.0" encoding="utf-8"?>
+<inkml:ink xmlns:inkml="http://www.w3.org/2003/InkML">
+  <inkml:definitions>
+    <inkml:context xml:id="ctx0">
+      <inkml:inkSource xml:id="inkSrc0">
+        <inkml:traceFormat>
+          <inkml:channel name="X" type="integer" min="-2.14748E9" max="2.14748E9" units="cm"/>
+          <inkml:channel name="Y" type="integer" min="-2.14748E9" max="2.14748E9" units="cm"/>
+        </inkml:traceFormat>
+        <inkml:channelProperties>
+          <inkml:channelProperty channel="X" name="resolution" value="1000" units="1/cm"/>
+          <inkml:channelProperty channel="Y" name="resolution" value="1000" units="1/cm"/>
+        </inkml:channelProperties>
+      </inkml:inkSource>
+      <inkml:timestamp xml:id="ts0" timeString="2021-05-13T11:54:18.997"/>
+    </inkml:context>
+    <inkml:brush xml:id="br0">
+      <inkml:brushProperty name="width" value="0.05" units="cm"/>
+      <inkml:brushProperty name="height" value="0.05" units="cm"/>
+      <inkml:brushProperty name="color" value="#E71224"/>
+      <inkml:brushProperty name="ignorePressure" value="1"/>
+    </inkml:brush>
+  </inkml:definitions>
+  <inkml:trace contextRef="#ctx0" brushRef="#br0">2 1,'0'68,"-2"-10,3-1,11 71,-9-110</inkml:trace>
+</inkml:ink>
+</file>
+
+<file path=ppt/ink/ink2.xml><?xml version="1.0" encoding="utf-8"?>
+<inkml:ink xmlns:inkml="http://www.w3.org/2003/InkML">
+  <inkml:definitions>
+    <inkml:context xml:id="ctx0">
+      <inkml:inkSource xml:id="inkSrc0">
+        <inkml:traceFormat>
+          <inkml:channel name="X" type="integer" min="-2.14748E9" max="2.14748E9" units="cm"/>
+          <inkml:channel name="Y" type="integer" min="-2.14748E9" max="2.14748E9" units="cm"/>
+        </inkml:traceFormat>
+        <inkml:channelProperties>
+          <inkml:channelProperty channel="X" name="resolution" value="1000" units="1/cm"/>
+          <inkml:channelProperty channel="Y" name="resolution" value="1000" units="1/cm"/>
+        </inkml:channelProperties>
+      </inkml:inkSource>
+      <inkml:timestamp xml:id="ts0" timeString="2021-05-13T11:54:20.815"/>
+    </inkml:context>
+    <inkml:brush xml:id="br0">
+      <inkml:brushProperty name="width" value="0.05" units="cm"/>
+      <inkml:brushProperty name="height" value="0.05" units="cm"/>
+      <inkml:brushProperty name="color" value="#E71224"/>
+      <inkml:brushProperty name="ignorePressure" value="1"/>
+    </inkml:brush>
+  </inkml:definitions>
+  <inkml:trace contextRef="#ctx0" brushRef="#br0">0 1,'424'0,"-409"0</inkml:trace>
+</inkml:ink>
+</file>
+
+<file path=ppt/ink/ink3.xml><?xml version="1.0" encoding="utf-8"?>
+<inkml:ink xmlns:inkml="http://www.w3.org/2003/InkML">
+  <inkml:definitions>
+    <inkml:context xml:id="ctx0">
+      <inkml:inkSource xml:id="inkSrc0">
+        <inkml:traceFormat>
+          <inkml:channel name="X" type="integer" min="-2.14748E9" max="2.14748E9" units="cm"/>
+          <inkml:channel name="Y" type="integer" min="-2.14748E9" max="2.14748E9" units="cm"/>
+        </inkml:traceFormat>
+        <inkml:channelProperties>
+          <inkml:channelProperty channel="X" name="resolution" value="1000" units="1/cm"/>
+          <inkml:channelProperty channel="Y" name="resolution" value="1000" units="1/cm"/>
+        </inkml:channelProperties>
+      </inkml:inkSource>
+      <inkml:timestamp xml:id="ts0" timeString="2021-05-13T11:54:42.448"/>
+    </inkml:context>
+    <inkml:brush xml:id="br0">
+      <inkml:brushProperty name="width" value="0.05" units="cm"/>
+      <inkml:brushProperty name="height" value="0.05" units="cm"/>
+      <inkml:brushProperty name="color" value="#E71224"/>
+      <inkml:brushProperty name="ignorePressure" value="1"/>
+    </inkml:brush>
+  </inkml:definitions>
+  <inkml:trace contextRef="#ctx0" brushRef="#br0">0 20,'15'5,"0"-1,0-1,0 0,1-1,-1 0,1-1,-1-1,18-2,6 2,457-1,-484 0,0 0,0-1,0-1,0 0,14-5,-14 4,0 0,1 1,-1 0,1 1,14-1,-10 3,-1 1</inkml:trace>
+</inkml:ink>
+</file>
+
+<file path=ppt/ink/ink4.xml><?xml version="1.0" encoding="utf-8"?>
+<inkml:ink xmlns:inkml="http://www.w3.org/2003/InkML">
+  <inkml:definitions>
+    <inkml:context xml:id="ctx0">
+      <inkml:inkSource xml:id="inkSrc0">
+        <inkml:traceFormat>
+          <inkml:channel name="X" type="integer" min="-2.14748E9" max="2.14748E9" units="cm"/>
+          <inkml:channel name="Y" type="integer" min="-2.14748E9" max="2.14748E9" units="cm"/>
+        </inkml:traceFormat>
+        <inkml:channelProperties>
+          <inkml:channelProperty channel="X" name="resolution" value="1000" units="1/cm"/>
+          <inkml:channelProperty channel="Y" name="resolution" value="1000" units="1/cm"/>
+        </inkml:channelProperties>
+      </inkml:inkSource>
+      <inkml:timestamp xml:id="ts0" timeString="2021-05-13T11:54:46.376"/>
+    </inkml:context>
+    <inkml:brush xml:id="br0">
+      <inkml:brushProperty name="width" value="0.05" units="cm"/>
+      <inkml:brushProperty name="height" value="0.05" units="cm"/>
+      <inkml:brushProperty name="color" value="#E71224"/>
+      <inkml:brushProperty name="ignorePressure" value="1"/>
+    </inkml:brush>
+  </inkml:definitions>
+  <inkml:trace contextRef="#ctx0" brushRef="#br0">1 1,'0'1,"1"0,-1 1,1-1,-1 0,1 0,0 1,0-1,-1 0,1 0,0 0,0 0,0 0,0 0,0 0,0 0,1-1,-1 1,0 0,0-1,3 2,32 13,-25-11,53 21,36 15,-90-35,0 0,0 1,-1 0,1 1,-1 0,15 16,-22-21,-1-1,1 1,0 0,-1 0,1 0,-1 0,0 0,0 0,0 0,0 0,0 1,0-1,-1 0,1 1,-1-1,1 0,-1 1,0-1,0 1,0-1,0 0,-1 1,1-1,0 0,-1 1,0-1,0 0,1 1,-1-1,-1 0,1 0,0 0,0 0,-1 0,1 0,-1 0,0-1,-1 2,-9 7,-1 0,0-1,0-1,0 0,-16 5,-10 8,21-9,14-8,-1-1,0 0,0 1,0-2,0 1,0-1,-1 1,1-2,-1 1,0 0,1-1,-9 0,0 0</inkml:trace>
+</inkml:ink>
+</file>
+
+<file path=ppt/ink/ink5.xml><?xml version="1.0" encoding="utf-8"?>
+<inkml:ink xmlns:inkml="http://www.w3.org/2003/InkML">
+  <inkml:definitions>
+    <inkml:context xml:id="ctx0">
+      <inkml:inkSource xml:id="inkSrc0">
+        <inkml:traceFormat>
+          <inkml:channel name="X" type="integer" min="-2.14748E9" max="2.14748E9" units="cm"/>
+          <inkml:channel name="Y" type="integer" min="-2.14748E9" max="2.14748E9" units="cm"/>
+        </inkml:traceFormat>
+        <inkml:channelProperties>
+          <inkml:channelProperty channel="X" name="resolution" value="1000" units="1/cm"/>
+          <inkml:channelProperty channel="Y" name="resolution" value="1000" units="1/cm"/>
+        </inkml:channelProperties>
+      </inkml:inkSource>
+      <inkml:timestamp xml:id="ts0" timeString="2021-05-13T11:55:04.943"/>
+    </inkml:context>
+    <inkml:brush xml:id="br0">
+      <inkml:brushProperty name="width" value="0.05" units="cm"/>
+      <inkml:brushProperty name="height" value="0.05" units="cm"/>
+      <inkml:brushProperty name="color" value="#E71224"/>
+      <inkml:brushProperty name="ignorePressure" value="1"/>
+    </inkml:brush>
+  </inkml:definitions>
+  <inkml:trace contextRef="#ctx0" brushRef="#br0">1 1</inkml:trace>
+</inkml:ink>
+</file>
+
+<file path=ppt/ink/ink6.xml><?xml version="1.0" encoding="utf-8"?>
+<inkml:ink xmlns:inkml="http://www.w3.org/2003/InkML">
+  <inkml:definitions>
+    <inkml:context xml:id="ctx0">
+      <inkml:inkSource xml:id="inkSrc0">
+        <inkml:traceFormat>
+          <inkml:channel name="X" type="integer" min="-2.14748E9" max="2.14748E9" units="cm"/>
+          <inkml:channel name="Y" type="integer" min="-2.14748E9" max="2.14748E9" units="cm"/>
+        </inkml:traceFormat>
+        <inkml:channelProperties>
+          <inkml:channelProperty channel="X" name="resolution" value="1000" units="1/cm"/>
+          <inkml:channelProperty channel="Y" name="resolution" value="1000" units="1/cm"/>
+        </inkml:channelProperties>
+      </inkml:inkSource>
+      <inkml:timestamp xml:id="ts0" timeString="2021-05-13T11:55:06.391"/>
+    </inkml:context>
+    <inkml:brush xml:id="br0">
+      <inkml:brushProperty name="width" value="0.05" units="cm"/>
+      <inkml:brushProperty name="height" value="0.05" units="cm"/>
+      <inkml:brushProperty name="color" value="#E71224"/>
+      <inkml:brushProperty name="ignorePressure" value="1"/>
+    </inkml:brush>
+  </inkml:definitions>
+  <inkml:trace contextRef="#ctx0" brushRef="#br0">0 1,'0'0</inkml:trace>
+</inkml:ink>
+</file>
+
+<file path=ppt/ink/ink7.xml><?xml version="1.0" encoding="utf-8"?>
+<inkml:ink xmlns:inkml="http://www.w3.org/2003/InkML">
+  <inkml:definitions>
+    <inkml:context xml:id="ctx0">
+      <inkml:inkSource xml:id="inkSrc0">
+        <inkml:traceFormat>
+          <inkml:channel name="X" type="integer" min="-2.14748E9" max="2.14748E9" units="cm"/>
+          <inkml:channel name="Y" type="integer" min="-2.14748E9" max="2.14748E9" units="cm"/>
+        </inkml:traceFormat>
+        <inkml:channelProperties>
+          <inkml:channelProperty channel="X" name="resolution" value="1000" units="1/cm"/>
+          <inkml:channelProperty channel="Y" name="resolution" value="1000" units="1/cm"/>
+        </inkml:channelProperties>
+      </inkml:inkSource>
+      <inkml:timestamp xml:id="ts0" timeString="2021-05-13T11:55:07.648"/>
+    </inkml:context>
+    <inkml:brush xml:id="br0">
+      <inkml:brushProperty name="width" value="0.05" units="cm"/>
+      <inkml:brushProperty name="height" value="0.05" units="cm"/>
+      <inkml:brushProperty name="color" value="#E71224"/>
+      <inkml:brushProperty name="ignorePressure" value="1"/>
+    </inkml:brush>
+  </inkml:definitions>
+  <inkml:trace contextRef="#ctx0" brushRef="#br0">1 0,'0'0</inkml:trace>
+</inkml:ink>
+</file>
+
+<file path=ppt/ink/ink8.xml><?xml version="1.0" encoding="utf-8"?>
+<inkml:ink xmlns:inkml="http://www.w3.org/2003/InkML">
+  <inkml:definitions>
+    <inkml:context xml:id="ctx0">
+      <inkml:inkSource xml:id="inkSrc0">
+        <inkml:traceFormat>
+          <inkml:channel name="X" type="integer" min="-2.14748E9" max="2.14748E9" units="cm"/>
+          <inkml:channel name="Y" type="integer" min="-2.14748E9" max="2.14748E9" units="cm"/>
+        </inkml:traceFormat>
+        <inkml:channelProperties>
+          <inkml:channelProperty channel="X" name="resolution" value="1000" units="1/cm"/>
+          <inkml:channelProperty channel="Y" name="resolution" value="1000" units="1/cm"/>
+        </inkml:channelProperties>
+      </inkml:inkSource>
+      <inkml:timestamp xml:id="ts0" timeString="2021-05-13T11:55:08.008"/>
+    </inkml:context>
+    <inkml:brush xml:id="br0">
+      <inkml:brushProperty name="width" value="0.05" units="cm"/>
+      <inkml:brushProperty name="height" value="0.05" units="cm"/>
+      <inkml:brushProperty name="color" value="#E71224"/>
+      <inkml:brushProperty name="ignorePressure" value="1"/>
+    </inkml:brush>
+  </inkml:definitions>
+  <inkml:trace contextRef="#ctx0" brushRef="#br0">1 0,'0'0</inkml:trace>
+</inkml:ink>
 </file>
 
 <file path=ppt/slideLayouts/slideLayout1.xml><?xml version="1.0" encoding="utf-8"?>
@@ -4771,6 +4988,1095 @@
 </p:sld>
 </file>
 
+<file path=ppt/slides/slide11.xml><?xml version="1.0" encoding="utf-8"?>
+<p:sld xmlns:a="http://schemas.openxmlformats.org/drawingml/2006/main" xmlns:r="http://schemas.openxmlformats.org/officeDocument/2006/relationships" xmlns:p="http://schemas.openxmlformats.org/presentationml/2006/main">
+  <p:cSld>
+    <p:bg>
+      <p:bgPr>
+        <a:solidFill>
+          <a:schemeClr val="bg1"/>
+        </a:solidFill>
+        <a:effectLst/>
+      </p:bgPr>
+    </p:bg>
+    <p:spTree>
+      <p:nvGrpSpPr>
+        <p:cNvPr id="1" name=""/>
+        <p:cNvGrpSpPr/>
+        <p:nvPr/>
+      </p:nvGrpSpPr>
+      <p:grpSpPr>
+        <a:xfrm>
+          <a:off x="0" y="0"/>
+          <a:ext cx="0" cy="0"/>
+          <a:chOff x="0" y="0"/>
+          <a:chExt cx="0" cy="0"/>
+        </a:xfrm>
+      </p:grpSpPr>
+      <p:sp useBgFill="1">
+        <p:nvSpPr>
+          <p:cNvPr id="10" name="Rectangle 9">
+            <a:extLst>
+              <a:ext uri="{FF2B5EF4-FFF2-40B4-BE49-F238E27FC236}">
+                <a16:creationId xmlns:a16="http://schemas.microsoft.com/office/drawing/2014/main" id="{A8384FB5-9ADC-4DDC-881B-597D56F5B15D}"/>
+              </a:ext>
+              <a:ext uri="{C183D7F6-B498-43B3-948B-1728B52AA6E4}">
+                <adec:decorative xmlns:adec="http://schemas.microsoft.com/office/drawing/2017/decorative" val="1"/>
+              </a:ext>
+            </a:extLst>
+          </p:cNvPr>
+          <p:cNvSpPr>
+            <a:spLocks noGrp="1" noRot="1" noChangeAspect="1" noMove="1" noResize="1" noEditPoints="1" noAdjustHandles="1" noChangeArrowheads="1" noChangeShapeType="1" noTextEdit="1"/>
+          </p:cNvSpPr>
+          <p:nvPr>
+            <p:extLst>
+              <p:ext uri="{386F3935-93C4-4BCD-93E2-E3B085C9AB24}">
+                <p16:designElem xmlns:p16="http://schemas.microsoft.com/office/powerpoint/2015/main" val="1"/>
+              </p:ext>
+            </p:extLst>
+          </p:nvPr>
+        </p:nvSpPr>
+        <p:spPr>
+          <a:xfrm>
+            <a:off x="0" y="0"/>
+            <a:ext cx="12192000" cy="6858000"/>
+          </a:xfrm>
+          <a:prstGeom prst="rect">
+            <a:avLst/>
+          </a:prstGeom>
+          <a:ln w="12700" cap="flat" cmpd="sng" algn="ctr">
+            <a:noFill/>
+            <a:prstDash val="solid"/>
+            <a:miter lim="800000"/>
+          </a:ln>
+          <a:effectLst/>
+          <a:extLst>
+            <a:ext uri="{91240B29-F687-4F45-9708-019B960494DF}">
+              <a14:hiddenLine xmlns:a14="http://schemas.microsoft.com/office/drawing/2010/main" w="12700" cap="flat" cmpd="sng" algn="ctr">
+                <a:solidFill>
+                  <a:schemeClr val="accent1">
+                    <a:shade val="50000"/>
+                  </a:schemeClr>
+                </a:solidFill>
+                <a:prstDash val="solid"/>
+                <a:miter lim="800000"/>
+              </a14:hiddenLine>
+            </a:ext>
+          </a:extLst>
+        </p:spPr>
+        <p:style>
+          <a:lnRef idx="2">
+            <a:schemeClr val="accent1">
+              <a:shade val="50000"/>
+            </a:schemeClr>
+          </a:lnRef>
+          <a:fillRef idx="1">
+            <a:schemeClr val="accent1"/>
+          </a:fillRef>
+          <a:effectRef idx="0">
+            <a:schemeClr val="accent1"/>
+          </a:effectRef>
+          <a:fontRef idx="minor">
+            <a:schemeClr val="lt1"/>
+          </a:fontRef>
+        </p:style>
+        <p:txBody>
+          <a:bodyPr rtlCol="0" anchor="ctr"/>
+          <a:lstStyle/>
+          <a:p>
+            <a:pPr algn="ctr"/>
+            <a:endParaRPr lang="en-US"/>
+          </a:p>
+        </p:txBody>
+      </p:sp>
+      <p:sp>
+        <p:nvSpPr>
+          <p:cNvPr id="12" name="Rectangle 11">
+            <a:extLst>
+              <a:ext uri="{FF2B5EF4-FFF2-40B4-BE49-F238E27FC236}">
+                <a16:creationId xmlns:a16="http://schemas.microsoft.com/office/drawing/2014/main" id="{91E5A9A7-95C6-4F4F-B00E-C82E07FE62EF}"/>
+              </a:ext>
+              <a:ext uri="{C183D7F6-B498-43B3-948B-1728B52AA6E4}">
+                <adec:decorative xmlns:adec="http://schemas.microsoft.com/office/drawing/2017/decorative" val="1"/>
+              </a:ext>
+            </a:extLst>
+          </p:cNvPr>
+          <p:cNvSpPr>
+            <a:spLocks noGrp="1" noRot="1" noChangeAspect="1" noMove="1" noResize="1" noEditPoints="1" noAdjustHandles="1" noChangeArrowheads="1" noChangeShapeType="1" noTextEdit="1"/>
+          </p:cNvSpPr>
+          <p:nvPr>
+            <p:extLst>
+              <p:ext uri="{386F3935-93C4-4BCD-93E2-E3B085C9AB24}">
+                <p16:designElem xmlns:p16="http://schemas.microsoft.com/office/powerpoint/2015/main" val="1"/>
+              </p:ext>
+            </p:extLst>
+          </p:nvPr>
+        </p:nvSpPr>
+        <p:spPr>
+          <a:xfrm rot="5400000" flipH="1">
+            <a:off x="-1417539" y="1417538"/>
+            <a:ext cx="6875818" cy="4040744"/>
+          </a:xfrm>
+          <a:prstGeom prst="rect">
+            <a:avLst/>
+          </a:prstGeom>
+          <a:gradFill>
+            <a:gsLst>
+              <a:gs pos="0">
+                <a:srgbClr val="000000"/>
+              </a:gs>
+              <a:gs pos="100000">
+                <a:schemeClr val="accent1">
+                  <a:lumMod val="75000"/>
+                </a:schemeClr>
+              </a:gs>
+            </a:gsLst>
+            <a:lin ang="18600000" scaled="0"/>
+          </a:gradFill>
+          <a:ln>
+            <a:noFill/>
+          </a:ln>
+        </p:spPr>
+        <p:style>
+          <a:lnRef idx="2">
+            <a:schemeClr val="accent1">
+              <a:shade val="50000"/>
+            </a:schemeClr>
+          </a:lnRef>
+          <a:fillRef idx="1">
+            <a:schemeClr val="accent1"/>
+          </a:fillRef>
+          <a:effectRef idx="0">
+            <a:schemeClr val="accent1"/>
+          </a:effectRef>
+          <a:fontRef idx="minor">
+            <a:schemeClr val="lt1"/>
+          </a:fontRef>
+        </p:style>
+        <p:txBody>
+          <a:bodyPr rtlCol="0" anchor="ctr"/>
+          <a:lstStyle/>
+          <a:p>
+            <a:pPr algn="ctr"/>
+            <a:endParaRPr lang="en-US" dirty="0"/>
+          </a:p>
+        </p:txBody>
+      </p:sp>
+      <p:sp>
+        <p:nvSpPr>
+          <p:cNvPr id="14" name="Rectangle 13">
+            <a:extLst>
+              <a:ext uri="{FF2B5EF4-FFF2-40B4-BE49-F238E27FC236}">
+                <a16:creationId xmlns:a16="http://schemas.microsoft.com/office/drawing/2014/main" id="{D07DD2DE-F619-49DD-B5E7-03A290FF4ED1}"/>
+              </a:ext>
+              <a:ext uri="{C183D7F6-B498-43B3-948B-1728B52AA6E4}">
+                <adec:decorative xmlns:adec="http://schemas.microsoft.com/office/drawing/2017/decorative" val="1"/>
+              </a:ext>
+            </a:extLst>
+          </p:cNvPr>
+          <p:cNvSpPr>
+            <a:spLocks noGrp="1" noRot="1" noChangeAspect="1" noMove="1" noResize="1" noEditPoints="1" noAdjustHandles="1" noChangeArrowheads="1" noChangeShapeType="1" noTextEdit="1"/>
+          </p:cNvSpPr>
+          <p:nvPr>
+            <p:extLst>
+              <p:ext uri="{386F3935-93C4-4BCD-93E2-E3B085C9AB24}">
+                <p16:designElem xmlns:p16="http://schemas.microsoft.com/office/powerpoint/2015/main" val="1"/>
+              </p:ext>
+            </p:extLst>
+          </p:nvPr>
+        </p:nvSpPr>
+        <p:spPr>
+          <a:xfrm rot="16200000">
+            <a:off x="-158495" y="2660473"/>
+            <a:ext cx="4355594" cy="4038603"/>
+          </a:xfrm>
+          <a:prstGeom prst="rect">
+            <a:avLst/>
+          </a:prstGeom>
+          <a:gradFill>
+            <a:gsLst>
+              <a:gs pos="0">
+                <a:schemeClr val="accent1">
+                  <a:alpha val="50000"/>
+                </a:schemeClr>
+              </a:gs>
+              <a:gs pos="100000">
+                <a:schemeClr val="accent1">
+                  <a:lumMod val="50000"/>
+                  <a:alpha val="0"/>
+                </a:schemeClr>
+              </a:gs>
+            </a:gsLst>
+            <a:lin ang="11400000" scaled="0"/>
+          </a:gradFill>
+          <a:ln>
+            <a:noFill/>
+          </a:ln>
+        </p:spPr>
+        <p:style>
+          <a:lnRef idx="2">
+            <a:schemeClr val="accent1">
+              <a:shade val="50000"/>
+            </a:schemeClr>
+          </a:lnRef>
+          <a:fillRef idx="1">
+            <a:schemeClr val="accent1"/>
+          </a:fillRef>
+          <a:effectRef idx="0">
+            <a:schemeClr val="accent1"/>
+          </a:effectRef>
+          <a:fontRef idx="minor">
+            <a:schemeClr val="lt1"/>
+          </a:fontRef>
+        </p:style>
+        <p:txBody>
+          <a:bodyPr rtlCol="0" anchor="ctr"/>
+          <a:lstStyle/>
+          <a:p>
+            <a:pPr algn="ctr"/>
+            <a:endParaRPr lang="en-US"/>
+          </a:p>
+        </p:txBody>
+      </p:sp>
+      <p:sp>
+        <p:nvSpPr>
+          <p:cNvPr id="16" name="Rectangle 15">
+            <a:extLst>
+              <a:ext uri="{FF2B5EF4-FFF2-40B4-BE49-F238E27FC236}">
+                <a16:creationId xmlns:a16="http://schemas.microsoft.com/office/drawing/2014/main" id="{85149191-5F60-4A28-AAFF-039F96B0F3EC}"/>
+              </a:ext>
+              <a:ext uri="{C183D7F6-B498-43B3-948B-1728B52AA6E4}">
+                <adec:decorative xmlns:adec="http://schemas.microsoft.com/office/drawing/2017/decorative" val="1"/>
+              </a:ext>
+            </a:extLst>
+          </p:cNvPr>
+          <p:cNvSpPr>
+            <a:spLocks noGrp="1" noRot="1" noChangeAspect="1" noMove="1" noResize="1" noEditPoints="1" noAdjustHandles="1" noChangeArrowheads="1" noChangeShapeType="1" noTextEdit="1"/>
+          </p:cNvSpPr>
+          <p:nvPr>
+            <p:extLst>
+              <p:ext uri="{386F3935-93C4-4BCD-93E2-E3B085C9AB24}">
+                <p16:designElem xmlns:p16="http://schemas.microsoft.com/office/powerpoint/2015/main" val="1"/>
+              </p:ext>
+            </p:extLst>
+          </p:nvPr>
+        </p:nvSpPr>
+        <p:spPr>
+          <a:xfrm rot="16200000" flipH="1">
+            <a:off x="-1180882" y="1638085"/>
+            <a:ext cx="6857572" cy="3581401"/>
+          </a:xfrm>
+          <a:prstGeom prst="rect">
+            <a:avLst/>
+          </a:prstGeom>
+          <a:gradFill>
+            <a:gsLst>
+              <a:gs pos="0">
+                <a:srgbClr val="000000">
+                  <a:alpha val="59000"/>
+                </a:srgbClr>
+              </a:gs>
+              <a:gs pos="69000">
+                <a:schemeClr val="accent1">
+                  <a:alpha val="0"/>
+                </a:schemeClr>
+              </a:gs>
+            </a:gsLst>
+            <a:lin ang="13200000" scaled="0"/>
+          </a:gradFill>
+          <a:ln>
+            <a:noFill/>
+          </a:ln>
+        </p:spPr>
+        <p:style>
+          <a:lnRef idx="2">
+            <a:schemeClr val="accent1">
+              <a:shade val="50000"/>
+            </a:schemeClr>
+          </a:lnRef>
+          <a:fillRef idx="1">
+            <a:schemeClr val="accent1"/>
+          </a:fillRef>
+          <a:effectRef idx="0">
+            <a:schemeClr val="accent1"/>
+          </a:effectRef>
+          <a:fontRef idx="minor">
+            <a:schemeClr val="lt1"/>
+          </a:fontRef>
+        </p:style>
+        <p:txBody>
+          <a:bodyPr rtlCol="0" anchor="ctr"/>
+          <a:lstStyle/>
+          <a:p>
+            <a:pPr algn="ctr"/>
+            <a:endParaRPr lang="en-US" dirty="0"/>
+          </a:p>
+        </p:txBody>
+      </p:sp>
+      <p:sp>
+        <p:nvSpPr>
+          <p:cNvPr id="18" name="Freeform: Shape 17">
+            <a:extLst>
+              <a:ext uri="{FF2B5EF4-FFF2-40B4-BE49-F238E27FC236}">
+                <a16:creationId xmlns:a16="http://schemas.microsoft.com/office/drawing/2014/main" id="{F8260ED5-17F7-4158-B241-D51DD4CF1B7E}"/>
+              </a:ext>
+              <a:ext uri="{C183D7F6-B498-43B3-948B-1728B52AA6E4}">
+                <adec:decorative xmlns:adec="http://schemas.microsoft.com/office/drawing/2017/decorative" val="1"/>
+              </a:ext>
+            </a:extLst>
+          </p:cNvPr>
+          <p:cNvSpPr>
+            <a:spLocks noGrp="1" noRot="1" noChangeAspect="1" noMove="1" noResize="1" noEditPoints="1" noAdjustHandles="1" noChangeArrowheads="1" noChangeShapeType="1" noTextEdit="1"/>
+          </p:cNvSpPr>
+          <p:nvPr>
+            <p:extLst>
+              <p:ext uri="{386F3935-93C4-4BCD-93E2-E3B085C9AB24}">
+                <p16:designElem xmlns:p16="http://schemas.microsoft.com/office/powerpoint/2015/main" val="1"/>
+              </p:ext>
+            </p:extLst>
+          </p:nvPr>
+        </p:nvSpPr>
+        <p:spPr>
+          <a:xfrm rot="6097846">
+            <a:off x="-747355" y="1201312"/>
+            <a:ext cx="4808302" cy="4088666"/>
+          </a:xfrm>
+          <a:custGeom>
+            <a:avLst/>
+            <a:gdLst>
+              <a:gd name="connsiteX0" fmla="*/ 48844 w 4808302"/>
+              <a:gd name="connsiteY0" fmla="*/ 2888671 h 4088666"/>
+              <a:gd name="connsiteX1" fmla="*/ 0 w 4808302"/>
+              <a:gd name="connsiteY1" fmla="*/ 2404151 h 4088666"/>
+              <a:gd name="connsiteX2" fmla="*/ 2404151 w 4808302"/>
+              <a:gd name="connsiteY2" fmla="*/ 0 h 4088666"/>
+              <a:gd name="connsiteX3" fmla="*/ 4808302 w 4808302"/>
+              <a:gd name="connsiteY3" fmla="*/ 2404151 h 4088666"/>
+              <a:gd name="connsiteX4" fmla="*/ 4700216 w 4808302"/>
+              <a:gd name="connsiteY4" fmla="*/ 3119072 h 4088666"/>
+              <a:gd name="connsiteX5" fmla="*/ 4643143 w 4808302"/>
+              <a:gd name="connsiteY5" fmla="*/ 3275009 h 4088666"/>
+              <a:gd name="connsiteX6" fmla="*/ 690093 w 4808302"/>
+              <a:gd name="connsiteY6" fmla="*/ 4088666 h 4088666"/>
+              <a:gd name="connsiteX7" fmla="*/ 548991 w 4808302"/>
+              <a:gd name="connsiteY7" fmla="*/ 3933414 h 4088666"/>
+              <a:gd name="connsiteX8" fmla="*/ 48844 w 4808302"/>
+              <a:gd name="connsiteY8" fmla="*/ 2888671 h 4088666"/>
+            </a:gdLst>
+            <a:ahLst/>
+            <a:cxnLst>
+              <a:cxn ang="0">
+                <a:pos x="connsiteX0" y="connsiteY0"/>
+              </a:cxn>
+              <a:cxn ang="0">
+                <a:pos x="connsiteX1" y="connsiteY1"/>
+              </a:cxn>
+              <a:cxn ang="0">
+                <a:pos x="connsiteX2" y="connsiteY2"/>
+              </a:cxn>
+              <a:cxn ang="0">
+                <a:pos x="connsiteX3" y="connsiteY3"/>
+              </a:cxn>
+              <a:cxn ang="0">
+                <a:pos x="connsiteX4" y="connsiteY4"/>
+              </a:cxn>
+              <a:cxn ang="0">
+                <a:pos x="connsiteX5" y="connsiteY5"/>
+              </a:cxn>
+              <a:cxn ang="0">
+                <a:pos x="connsiteX6" y="connsiteY6"/>
+              </a:cxn>
+              <a:cxn ang="0">
+                <a:pos x="connsiteX7" y="connsiteY7"/>
+              </a:cxn>
+              <a:cxn ang="0">
+                <a:pos x="connsiteX8" y="connsiteY8"/>
+              </a:cxn>
+            </a:cxnLst>
+            <a:rect l="l" t="t" r="r" b="b"/>
+            <a:pathLst>
+              <a:path w="4808302" h="4088666">
+                <a:moveTo>
+                  <a:pt x="48844" y="2888671"/>
+                </a:moveTo>
+                <a:cubicBezTo>
+                  <a:pt x="16818" y="2732167"/>
+                  <a:pt x="0" y="2570123"/>
+                  <a:pt x="0" y="2404151"/>
+                </a:cubicBezTo>
+                <a:cubicBezTo>
+                  <a:pt x="0" y="1076375"/>
+                  <a:pt x="1076375" y="0"/>
+                  <a:pt x="2404151" y="0"/>
+                </a:cubicBezTo>
+                <a:cubicBezTo>
+                  <a:pt x="3731927" y="0"/>
+                  <a:pt x="4808302" y="1076375"/>
+                  <a:pt x="4808302" y="2404151"/>
+                </a:cubicBezTo>
+                <a:cubicBezTo>
+                  <a:pt x="4808302" y="2653109"/>
+                  <a:pt x="4770461" y="2893229"/>
+                  <a:pt x="4700216" y="3119072"/>
+                </a:cubicBezTo>
+                <a:lnTo>
+                  <a:pt x="4643143" y="3275009"/>
+                </a:lnTo>
+                <a:lnTo>
+                  <a:pt x="690093" y="4088666"/>
+                </a:lnTo>
+                <a:lnTo>
+                  <a:pt x="548991" y="3933414"/>
+                </a:lnTo>
+                <a:cubicBezTo>
+                  <a:pt x="304015" y="3636572"/>
+                  <a:pt x="128908" y="3279932"/>
+                  <a:pt x="48844" y="2888671"/>
+                </a:cubicBezTo>
+                <a:close/>
+              </a:path>
+            </a:pathLst>
+          </a:custGeom>
+          <a:gradFill>
+            <a:gsLst>
+              <a:gs pos="39000">
+                <a:schemeClr val="accent1">
+                  <a:lumMod val="60000"/>
+                  <a:lumOff val="40000"/>
+                  <a:alpha val="0"/>
+                </a:schemeClr>
+              </a:gs>
+              <a:gs pos="100000">
+                <a:schemeClr val="accent1">
+                  <a:lumMod val="75000"/>
+                  <a:alpha val="26000"/>
+                </a:schemeClr>
+              </a:gs>
+            </a:gsLst>
+            <a:lin ang="18600000" scaled="0"/>
+          </a:gradFill>
+          <a:ln>
+            <a:noFill/>
+          </a:ln>
+        </p:spPr>
+        <p:style>
+          <a:lnRef idx="2">
+            <a:schemeClr val="accent1">
+              <a:shade val="50000"/>
+            </a:schemeClr>
+          </a:lnRef>
+          <a:fillRef idx="1">
+            <a:schemeClr val="accent1"/>
+          </a:fillRef>
+          <a:effectRef idx="0">
+            <a:schemeClr val="accent1"/>
+          </a:effectRef>
+          <a:fontRef idx="minor">
+            <a:schemeClr val="lt1"/>
+          </a:fontRef>
+        </p:style>
+        <p:txBody>
+          <a:bodyPr wrap="square" rtlCol="0" anchor="ctr">
+            <a:noAutofit/>
+          </a:bodyPr>
+          <a:lstStyle/>
+          <a:p>
+            <a:pPr algn="ctr"/>
+            <a:endParaRPr lang="en-US" dirty="0"/>
+          </a:p>
+        </p:txBody>
+      </p:sp>
+      <p:sp>
+        <p:nvSpPr>
+          <p:cNvPr id="2" name="Cím 1">
+            <a:extLst>
+              <a:ext uri="{FF2B5EF4-FFF2-40B4-BE49-F238E27FC236}">
+                <a16:creationId xmlns:a16="http://schemas.microsoft.com/office/drawing/2014/main" id="{B2A0928F-D58D-4CF1-9C6C-0CB712D7A6B9}"/>
+              </a:ext>
+            </a:extLst>
+          </p:cNvPr>
+          <p:cNvSpPr>
+            <a:spLocks noGrp="1"/>
+          </p:cNvSpPr>
+          <p:nvPr>
+            <p:ph type="ctrTitle"/>
+          </p:nvPr>
+        </p:nvSpPr>
+        <p:spPr>
+          <a:xfrm>
+            <a:off x="660041" y="1325489"/>
+            <a:ext cx="2880828" cy="4513523"/>
+          </a:xfrm>
+        </p:spPr>
+        <p:txBody>
+          <a:bodyPr anchor="t">
+            <a:normAutofit/>
+          </a:bodyPr>
+          <a:lstStyle/>
+          <a:p>
+            <a:pPr algn="l"/>
+            <a:r>
+              <a:rPr lang="hu-HU" sz="2000" dirty="0">
+                <a:solidFill>
+                  <a:srgbClr val="FFFFFF"/>
+                </a:solidFill>
+              </a:rPr>
+              <a:t>A program jó alapot biztosíthat egy tényleges raktárkezelő programnak, továbbá kiegészíthető egy gépösszerakó funkcióval.</a:t>
+            </a:r>
+            <a:br>
+              <a:rPr lang="hu-HU" sz="2000" dirty="0">
+                <a:solidFill>
+                  <a:srgbClr val="FFFFFF"/>
+                </a:solidFill>
+              </a:rPr>
+            </a:br>
+            <a:br>
+              <a:rPr lang="hu-HU" sz="2000" dirty="0">
+                <a:solidFill>
+                  <a:srgbClr val="FFFFFF"/>
+                </a:solidFill>
+              </a:rPr>
+            </a:br>
+            <a:endParaRPr lang="hu-HU" sz="2000" dirty="0">
+              <a:solidFill>
+                <a:srgbClr val="FFFFFF"/>
+              </a:solidFill>
+            </a:endParaRPr>
+          </a:p>
+        </p:txBody>
+      </p:sp>
+      <p:sp>
+        <p:nvSpPr>
+          <p:cNvPr id="3" name="Alcím 2">
+            <a:extLst>
+              <a:ext uri="{FF2B5EF4-FFF2-40B4-BE49-F238E27FC236}">
+                <a16:creationId xmlns:a16="http://schemas.microsoft.com/office/drawing/2014/main" id="{9C9AE997-4508-48BB-8A35-FB9009EFD7B5}"/>
+              </a:ext>
+            </a:extLst>
+          </p:cNvPr>
+          <p:cNvSpPr>
+            <a:spLocks noGrp="1"/>
+          </p:cNvSpPr>
+          <p:nvPr>
+            <p:ph type="subTitle" idx="1"/>
+          </p:nvPr>
+        </p:nvSpPr>
+        <p:spPr>
+          <a:xfrm>
+            <a:off x="640586" y="306501"/>
+            <a:ext cx="2919738" cy="712487"/>
+          </a:xfrm>
+        </p:spPr>
+        <p:txBody>
+          <a:bodyPr anchor="b">
+            <a:normAutofit/>
+          </a:bodyPr>
+          <a:lstStyle/>
+          <a:p>
+            <a:r>
+              <a:rPr lang="hu-HU" sz="4400" dirty="0">
+                <a:solidFill>
+                  <a:srgbClr val="FFFFFF"/>
+                </a:solidFill>
+              </a:rPr>
+              <a:t>Új funkciók</a:t>
+            </a:r>
+          </a:p>
+        </p:txBody>
+      </p:sp>
+      <p:pic>
+        <p:nvPicPr>
+          <p:cNvPr id="6" name="Kép 5">
+            <a:extLst>
+              <a:ext uri="{FF2B5EF4-FFF2-40B4-BE49-F238E27FC236}">
+                <a16:creationId xmlns:a16="http://schemas.microsoft.com/office/drawing/2014/main" id="{9C94AE92-0912-4E10-92E0-52F7D84278A8}"/>
+              </a:ext>
+            </a:extLst>
+          </p:cNvPr>
+          <p:cNvPicPr>
+            <a:picLocks noChangeAspect="1"/>
+          </p:cNvPicPr>
+          <p:nvPr/>
+        </p:nvPicPr>
+        <p:blipFill>
+          <a:blip r:embed="rId2"/>
+          <a:stretch>
+            <a:fillRect/>
+          </a:stretch>
+        </p:blipFill>
+        <p:spPr>
+          <a:xfrm>
+            <a:off x="4471840" y="1551113"/>
+            <a:ext cx="7152644" cy="3773592"/>
+          </a:xfrm>
+          <a:prstGeom prst="rect">
+            <a:avLst/>
+          </a:prstGeom>
+        </p:spPr>
+      </p:pic>
+      <p:grpSp>
+        <p:nvGrpSpPr>
+          <p:cNvPr id="11" name="Csoportba foglalás 10">
+            <a:extLst>
+              <a:ext uri="{FF2B5EF4-FFF2-40B4-BE49-F238E27FC236}">
+                <a16:creationId xmlns:a16="http://schemas.microsoft.com/office/drawing/2014/main" id="{A8037594-8B0B-45BB-ACA6-67846C0A1F71}"/>
+              </a:ext>
+            </a:extLst>
+          </p:cNvPr>
+          <p:cNvGrpSpPr/>
+          <p:nvPr/>
+        </p:nvGrpSpPr>
+        <p:grpSpPr>
+          <a:xfrm>
+            <a:off x="11429920" y="2139580"/>
+            <a:ext cx="158400" cy="118800"/>
+            <a:chOff x="11429920" y="2139580"/>
+            <a:chExt cx="158400" cy="118800"/>
+          </a:xfrm>
+        </p:grpSpPr>
+        <mc:AlternateContent xmlns:mc="http://schemas.openxmlformats.org/markup-compatibility/2006">
+          <mc:Choice xmlns:p14="http://schemas.microsoft.com/office/powerpoint/2010/main" Requires="p14">
+            <p:contentPart p14:bwMode="auto" r:id="rId3">
+              <p14:nvContentPartPr>
+                <p14:cNvPr id="8" name="Szabadkéz 7">
+                  <a:extLst>
+                    <a:ext uri="{FF2B5EF4-FFF2-40B4-BE49-F238E27FC236}">
+                      <a16:creationId xmlns:a16="http://schemas.microsoft.com/office/drawing/2014/main" id="{9EC693CF-9E0F-4A64-AE4D-2019A3986F73}"/>
+                    </a:ext>
+                  </a:extLst>
+                </p14:cNvPr>
+                <p14:cNvContentPartPr/>
+                <p14:nvPr/>
+              </p14:nvContentPartPr>
+              <p14:xfrm>
+                <a:off x="11499040" y="2139580"/>
+                <a:ext cx="6120" cy="118800"/>
+              </p14:xfrm>
+            </p:contentPart>
+          </mc:Choice>
+          <mc:Fallback>
+            <p:pic>
+              <p:nvPicPr>
+                <p:cNvPr id="8" name="Szabadkéz 7">
+                  <a:extLst>
+                    <a:ext uri="{FF2B5EF4-FFF2-40B4-BE49-F238E27FC236}">
+                      <a16:creationId xmlns:a16="http://schemas.microsoft.com/office/drawing/2014/main" id="{9EC693CF-9E0F-4A64-AE4D-2019A3986F73}"/>
+                    </a:ext>
+                  </a:extLst>
+                </p:cNvPr>
+                <p:cNvPicPr/>
+                <p:nvPr/>
+              </p:nvPicPr>
+              <p:blipFill>
+                <a:blip r:embed="rId4"/>
+                <a:stretch>
+                  <a:fillRect/>
+                </a:stretch>
+              </p:blipFill>
+              <p:spPr>
+                <a:xfrm>
+                  <a:off x="11490040" y="2130940"/>
+                  <a:ext cx="23760" cy="136440"/>
+                </a:xfrm>
+                <a:prstGeom prst="rect">
+                  <a:avLst/>
+                </a:prstGeom>
+              </p:spPr>
+            </p:pic>
+          </mc:Fallback>
+        </mc:AlternateContent>
+        <mc:AlternateContent xmlns:mc="http://schemas.openxmlformats.org/markup-compatibility/2006">
+          <mc:Choice xmlns:p14="http://schemas.microsoft.com/office/powerpoint/2010/main" Requires="p14">
+            <p:contentPart p14:bwMode="auto" r:id="rId5">
+              <p14:nvContentPartPr>
+                <p14:cNvPr id="9" name="Szabadkéz 8">
+                  <a:extLst>
+                    <a:ext uri="{FF2B5EF4-FFF2-40B4-BE49-F238E27FC236}">
+                      <a16:creationId xmlns:a16="http://schemas.microsoft.com/office/drawing/2014/main" id="{C47B79B9-9538-47D2-9166-4EE36EB56049}"/>
+                    </a:ext>
+                  </a:extLst>
+                </p14:cNvPr>
+                <p14:cNvContentPartPr/>
+                <p14:nvPr/>
+              </p14:nvContentPartPr>
+              <p14:xfrm>
+                <a:off x="11429920" y="2202940"/>
+                <a:ext cx="158400" cy="360"/>
+              </p14:xfrm>
+            </p:contentPart>
+          </mc:Choice>
+          <mc:Fallback>
+            <p:pic>
+              <p:nvPicPr>
+                <p:cNvPr id="9" name="Szabadkéz 8">
+                  <a:extLst>
+                    <a:ext uri="{FF2B5EF4-FFF2-40B4-BE49-F238E27FC236}">
+                      <a16:creationId xmlns:a16="http://schemas.microsoft.com/office/drawing/2014/main" id="{C47B79B9-9538-47D2-9166-4EE36EB56049}"/>
+                    </a:ext>
+                  </a:extLst>
+                </p:cNvPr>
+                <p:cNvPicPr/>
+                <p:nvPr/>
+              </p:nvPicPr>
+              <p:blipFill>
+                <a:blip r:embed="rId6"/>
+                <a:stretch>
+                  <a:fillRect/>
+                </a:stretch>
+              </p:blipFill>
+              <p:spPr>
+                <a:xfrm>
+                  <a:off x="11420920" y="2194300"/>
+                  <a:ext cx="176040" cy="18000"/>
+                </a:xfrm>
+                <a:prstGeom prst="rect">
+                  <a:avLst/>
+                </a:prstGeom>
+              </p:spPr>
+            </p:pic>
+          </mc:Fallback>
+        </mc:AlternateContent>
+      </p:grpSp>
+      <mc:AlternateContent xmlns:mc="http://schemas.openxmlformats.org/markup-compatibility/2006">
+        <mc:Choice xmlns:p14="http://schemas.microsoft.com/office/powerpoint/2010/main" Requires="p14">
+          <p:contentPart p14:bwMode="auto" r:id="rId7">
+            <p14:nvContentPartPr>
+              <p14:cNvPr id="17" name="Szabadkéz 16">
+                <a:extLst>
+                  <a:ext uri="{FF2B5EF4-FFF2-40B4-BE49-F238E27FC236}">
+                    <a16:creationId xmlns:a16="http://schemas.microsoft.com/office/drawing/2014/main" id="{5E3ECC05-5CA0-4FD8-AD1D-7B3164D304C6}"/>
+                  </a:ext>
+                </a:extLst>
+              </p14:cNvPr>
+              <p14:cNvContentPartPr/>
+              <p14:nvPr/>
+            </p14:nvContentPartPr>
+            <p14:xfrm>
+              <a:off x="11182240" y="2005780"/>
+              <a:ext cx="323280" cy="14760"/>
+            </p14:xfrm>
+          </p:contentPart>
+        </mc:Choice>
+        <mc:Fallback>
+          <p:pic>
+            <p:nvPicPr>
+              <p:cNvPr id="17" name="Szabadkéz 16">
+                <a:extLst>
+                  <a:ext uri="{FF2B5EF4-FFF2-40B4-BE49-F238E27FC236}">
+                    <a16:creationId xmlns:a16="http://schemas.microsoft.com/office/drawing/2014/main" id="{5E3ECC05-5CA0-4FD8-AD1D-7B3164D304C6}"/>
+                  </a:ext>
+                </a:extLst>
+              </p:cNvPr>
+              <p:cNvPicPr/>
+              <p:nvPr/>
+            </p:nvPicPr>
+            <p:blipFill>
+              <a:blip r:embed="rId8"/>
+              <a:stretch>
+                <a:fillRect/>
+              </a:stretch>
+            </p:blipFill>
+            <p:spPr>
+              <a:xfrm>
+                <a:off x="11173240" y="1996780"/>
+                <a:ext cx="340920" cy="32400"/>
+              </a:xfrm>
+              <a:prstGeom prst="rect">
+                <a:avLst/>
+              </a:prstGeom>
+            </p:spPr>
+          </p:pic>
+        </mc:Fallback>
+      </mc:AlternateContent>
+      <mc:AlternateContent xmlns:mc="http://schemas.openxmlformats.org/markup-compatibility/2006">
+        <mc:Choice xmlns:p14="http://schemas.microsoft.com/office/powerpoint/2010/main" Requires="p14">
+          <p:contentPart p14:bwMode="auto" r:id="rId9">
+            <p14:nvContentPartPr>
+              <p14:cNvPr id="19" name="Szabadkéz 18">
+                <a:extLst>
+                  <a:ext uri="{FF2B5EF4-FFF2-40B4-BE49-F238E27FC236}">
+                    <a16:creationId xmlns:a16="http://schemas.microsoft.com/office/drawing/2014/main" id="{E49C9563-135E-4BF1-8DD6-6B628381C68E}"/>
+                  </a:ext>
+                </a:extLst>
+              </p14:cNvPr>
+              <p14:cNvContentPartPr/>
+              <p14:nvPr/>
+            </p14:nvContentPartPr>
+            <p14:xfrm>
+              <a:off x="11416960" y="1942780"/>
+              <a:ext cx="120240" cy="134280"/>
+            </p14:xfrm>
+          </p:contentPart>
+        </mc:Choice>
+        <mc:Fallback>
+          <p:pic>
+            <p:nvPicPr>
+              <p:cNvPr id="19" name="Szabadkéz 18">
+                <a:extLst>
+                  <a:ext uri="{FF2B5EF4-FFF2-40B4-BE49-F238E27FC236}">
+                    <a16:creationId xmlns:a16="http://schemas.microsoft.com/office/drawing/2014/main" id="{E49C9563-135E-4BF1-8DD6-6B628381C68E}"/>
+                  </a:ext>
+                </a:extLst>
+              </p:cNvPr>
+              <p:cNvPicPr/>
+              <p:nvPr/>
+            </p:nvPicPr>
+            <p:blipFill>
+              <a:blip r:embed="rId10"/>
+              <a:stretch>
+                <a:fillRect/>
+              </a:stretch>
+            </p:blipFill>
+            <p:spPr>
+              <a:xfrm>
+                <a:off x="11408320" y="1934140"/>
+                <a:ext cx="137880" cy="151920"/>
+              </a:xfrm>
+              <a:prstGeom prst="rect">
+                <a:avLst/>
+              </a:prstGeom>
+            </p:spPr>
+          </p:pic>
+        </mc:Fallback>
+      </mc:AlternateContent>
+      <mc:AlternateContent xmlns:mc="http://schemas.openxmlformats.org/markup-compatibility/2006">
+        <mc:Choice xmlns:p14="http://schemas.microsoft.com/office/powerpoint/2010/main" Requires="p14">
+          <p:contentPart p14:bwMode="auto" r:id="rId11">
+            <p14:nvContentPartPr>
+              <p14:cNvPr id="21" name="Szabadkéz 20">
+                <a:extLst>
+                  <a:ext uri="{FF2B5EF4-FFF2-40B4-BE49-F238E27FC236}">
+                    <a16:creationId xmlns:a16="http://schemas.microsoft.com/office/drawing/2014/main" id="{3C35E94A-8A08-4A40-8DC0-7CC4C3094938}"/>
+                  </a:ext>
+                </a:extLst>
+              </p14:cNvPr>
+              <p14:cNvContentPartPr/>
+              <p14:nvPr/>
+            </p14:nvContentPartPr>
+            <p14:xfrm>
+              <a:off x="10908780" y="4711420"/>
+              <a:ext cx="360" cy="360"/>
+            </p14:xfrm>
+          </p:contentPart>
+        </mc:Choice>
+        <mc:Fallback>
+          <p:pic>
+            <p:nvPicPr>
+              <p:cNvPr id="21" name="Szabadkéz 20">
+                <a:extLst>
+                  <a:ext uri="{FF2B5EF4-FFF2-40B4-BE49-F238E27FC236}">
+                    <a16:creationId xmlns:a16="http://schemas.microsoft.com/office/drawing/2014/main" id="{3C35E94A-8A08-4A40-8DC0-7CC4C3094938}"/>
+                  </a:ext>
+                </a:extLst>
+              </p:cNvPr>
+              <p:cNvPicPr/>
+              <p:nvPr/>
+            </p:nvPicPr>
+            <p:blipFill>
+              <a:blip r:embed="rId12"/>
+              <a:stretch>
+                <a:fillRect/>
+              </a:stretch>
+            </p:blipFill>
+            <p:spPr>
+              <a:xfrm>
+                <a:off x="10900140" y="4702780"/>
+                <a:ext cx="18000" cy="18000"/>
+              </a:xfrm>
+              <a:prstGeom prst="rect">
+                <a:avLst/>
+              </a:prstGeom>
+            </p:spPr>
+          </p:pic>
+        </mc:Fallback>
+      </mc:AlternateContent>
+      <mc:AlternateContent xmlns:mc="http://schemas.openxmlformats.org/markup-compatibility/2006">
+        <mc:Choice xmlns:p14="http://schemas.microsoft.com/office/powerpoint/2010/main" Requires="p14">
+          <p:contentPart p14:bwMode="auto" r:id="rId13">
+            <p14:nvContentPartPr>
+              <p14:cNvPr id="22" name="Szabadkéz 21">
+                <a:extLst>
+                  <a:ext uri="{FF2B5EF4-FFF2-40B4-BE49-F238E27FC236}">
+                    <a16:creationId xmlns:a16="http://schemas.microsoft.com/office/drawing/2014/main" id="{5CF79409-AA31-4D30-97A7-8AED7B68258F}"/>
+                  </a:ext>
+                </a:extLst>
+              </p14:cNvPr>
+              <p14:cNvContentPartPr/>
+              <p14:nvPr/>
+            </p14:nvContentPartPr>
+            <p14:xfrm>
+              <a:off x="8191140" y="3797020"/>
+              <a:ext cx="360" cy="360"/>
+            </p14:xfrm>
+          </p:contentPart>
+        </mc:Choice>
+        <mc:Fallback>
+          <p:pic>
+            <p:nvPicPr>
+              <p:cNvPr id="22" name="Szabadkéz 21">
+                <a:extLst>
+                  <a:ext uri="{FF2B5EF4-FFF2-40B4-BE49-F238E27FC236}">
+                    <a16:creationId xmlns:a16="http://schemas.microsoft.com/office/drawing/2014/main" id="{5CF79409-AA31-4D30-97A7-8AED7B68258F}"/>
+                  </a:ext>
+                </a:extLst>
+              </p:cNvPr>
+              <p:cNvPicPr/>
+              <p:nvPr/>
+            </p:nvPicPr>
+            <p:blipFill>
+              <a:blip r:embed="rId12"/>
+              <a:stretch>
+                <a:fillRect/>
+              </a:stretch>
+            </p:blipFill>
+            <p:spPr>
+              <a:xfrm>
+                <a:off x="8182140" y="3788380"/>
+                <a:ext cx="18000" cy="18000"/>
+              </a:xfrm>
+              <a:prstGeom prst="rect">
+                <a:avLst/>
+              </a:prstGeom>
+            </p:spPr>
+          </p:pic>
+        </mc:Fallback>
+      </mc:AlternateContent>
+      <p:grpSp>
+        <p:nvGrpSpPr>
+          <p:cNvPr id="25" name="Csoportba foglalás 24">
+            <a:extLst>
+              <a:ext uri="{FF2B5EF4-FFF2-40B4-BE49-F238E27FC236}">
+                <a16:creationId xmlns:a16="http://schemas.microsoft.com/office/drawing/2014/main" id="{816AECBC-E58B-4BED-BA43-EC5E3E66BD47}"/>
+              </a:ext>
+            </a:extLst>
+          </p:cNvPr>
+          <p:cNvGrpSpPr/>
+          <p:nvPr/>
+        </p:nvGrpSpPr>
+        <p:grpSpPr>
+          <a:xfrm>
+            <a:off x="6336780" y="3098340"/>
+            <a:ext cx="360" cy="360"/>
+            <a:chOff x="6336780" y="3098340"/>
+            <a:chExt cx="360" cy="360"/>
+          </a:xfrm>
+        </p:grpSpPr>
+        <mc:AlternateContent xmlns:mc="http://schemas.openxmlformats.org/markup-compatibility/2006">
+          <mc:Choice xmlns:p14="http://schemas.microsoft.com/office/powerpoint/2010/main" Requires="p14">
+            <p:contentPart p14:bwMode="auto" r:id="rId14">
+              <p14:nvContentPartPr>
+                <p14:cNvPr id="23" name="Szabadkéz 22">
+                  <a:extLst>
+                    <a:ext uri="{FF2B5EF4-FFF2-40B4-BE49-F238E27FC236}">
+                      <a16:creationId xmlns:a16="http://schemas.microsoft.com/office/drawing/2014/main" id="{B4539577-E297-4AED-B54E-544537220807}"/>
+                    </a:ext>
+                  </a:extLst>
+                </p14:cNvPr>
+                <p14:cNvContentPartPr/>
+                <p14:nvPr/>
+              </p14:nvContentPartPr>
+              <p14:xfrm>
+                <a:off x="6336780" y="3098340"/>
+                <a:ext cx="360" cy="360"/>
+              </p14:xfrm>
+            </p:contentPart>
+          </mc:Choice>
+          <mc:Fallback>
+            <p:pic>
+              <p:nvPicPr>
+                <p:cNvPr id="23" name="Szabadkéz 22">
+                  <a:extLst>
+                    <a:ext uri="{FF2B5EF4-FFF2-40B4-BE49-F238E27FC236}">
+                      <a16:creationId xmlns:a16="http://schemas.microsoft.com/office/drawing/2014/main" id="{B4539577-E297-4AED-B54E-544537220807}"/>
+                    </a:ext>
+                  </a:extLst>
+                </p:cNvPr>
+                <p:cNvPicPr/>
+                <p:nvPr/>
+              </p:nvPicPr>
+              <p:blipFill>
+                <a:blip r:embed="rId12"/>
+                <a:stretch>
+                  <a:fillRect/>
+                </a:stretch>
+              </p:blipFill>
+              <p:spPr>
+                <a:xfrm>
+                  <a:off x="6328140" y="3089340"/>
+                  <a:ext cx="18000" cy="18000"/>
+                </a:xfrm>
+                <a:prstGeom prst="rect">
+                  <a:avLst/>
+                </a:prstGeom>
+              </p:spPr>
+            </p:pic>
+          </mc:Fallback>
+        </mc:AlternateContent>
+        <mc:AlternateContent xmlns:mc="http://schemas.openxmlformats.org/markup-compatibility/2006">
+          <mc:Choice xmlns:p14="http://schemas.microsoft.com/office/powerpoint/2010/main" Requires="p14">
+            <p:contentPart p14:bwMode="auto" r:id="rId15">
+              <p14:nvContentPartPr>
+                <p14:cNvPr id="24" name="Szabadkéz 23">
+                  <a:extLst>
+                    <a:ext uri="{FF2B5EF4-FFF2-40B4-BE49-F238E27FC236}">
+                      <a16:creationId xmlns:a16="http://schemas.microsoft.com/office/drawing/2014/main" id="{C33827CD-72C5-40AB-84D6-CD719BD420B9}"/>
+                    </a:ext>
+                  </a:extLst>
+                </p14:cNvPr>
+                <p14:cNvContentPartPr/>
+                <p14:nvPr/>
+              </p14:nvContentPartPr>
+              <p14:xfrm>
+                <a:off x="6336780" y="3098340"/>
+                <a:ext cx="360" cy="360"/>
+              </p14:xfrm>
+            </p:contentPart>
+          </mc:Choice>
+          <mc:Fallback>
+            <p:pic>
+              <p:nvPicPr>
+                <p:cNvPr id="24" name="Szabadkéz 23">
+                  <a:extLst>
+                    <a:ext uri="{FF2B5EF4-FFF2-40B4-BE49-F238E27FC236}">
+                      <a16:creationId xmlns:a16="http://schemas.microsoft.com/office/drawing/2014/main" id="{C33827CD-72C5-40AB-84D6-CD719BD420B9}"/>
+                    </a:ext>
+                  </a:extLst>
+                </p:cNvPr>
+                <p:cNvPicPr/>
+                <p:nvPr/>
+              </p:nvPicPr>
+              <p:blipFill>
+                <a:blip r:embed="rId12"/>
+                <a:stretch>
+                  <a:fillRect/>
+                </a:stretch>
+              </p:blipFill>
+              <p:spPr>
+                <a:xfrm>
+                  <a:off x="6328140" y="3089340"/>
+                  <a:ext cx="18000" cy="18000"/>
+                </a:xfrm>
+                <a:prstGeom prst="rect">
+                  <a:avLst/>
+                </a:prstGeom>
+              </p:spPr>
+            </p:pic>
+          </mc:Fallback>
+        </mc:AlternateContent>
+      </p:grpSp>
+    </p:spTree>
+    <p:extLst>
+      <p:ext uri="{BB962C8B-B14F-4D97-AF65-F5344CB8AC3E}">
+        <p14:creationId xmlns:p14="http://schemas.microsoft.com/office/powerpoint/2010/main" val="738644402"/>
+      </p:ext>
+    </p:extLst>
+  </p:cSld>
+  <p:clrMapOvr>
+    <a:masterClrMapping/>
+  </p:clrMapOvr>
+</p:sld>
+</file>
+
 <file path=ppt/slides/slide2.xml><?xml version="1.0" encoding="utf-8"?>
 <p:sld xmlns:a="http://schemas.openxmlformats.org/drawingml/2006/main" xmlns:r="http://schemas.openxmlformats.org/officeDocument/2006/relationships" xmlns:p="http://schemas.openxmlformats.org/presentationml/2006/main">
   <p:cSld>
@@ -6271,10 +7577,10 @@
       </p:sp>
       <p:pic>
         <p:nvPicPr>
-          <p:cNvPr id="7" name="Kép 6">
-            <a:extLst>
-              <a:ext uri="{FF2B5EF4-FFF2-40B4-BE49-F238E27FC236}">
-                <a16:creationId xmlns:a16="http://schemas.microsoft.com/office/drawing/2014/main" id="{4012CBCF-80E1-4819-8BA1-383216728D99}"/>
+          <p:cNvPr id="5" name="Kép 4">
+            <a:extLst>
+              <a:ext uri="{FF2B5EF4-FFF2-40B4-BE49-F238E27FC236}">
+                <a16:creationId xmlns:a16="http://schemas.microsoft.com/office/drawing/2014/main" id="{400BEC79-B9AD-42ED-9116-5F91F0799C86}"/>
               </a:ext>
             </a:extLst>
           </p:cNvPr>
@@ -6291,8 +7597,8 @@
         </p:blipFill>
         <p:spPr>
           <a:xfrm>
-            <a:off x="4143840" y="811823"/>
-            <a:ext cx="7953040" cy="5234353"/>
+            <a:off x="4187007" y="1282491"/>
+            <a:ext cx="7810721" cy="4120781"/>
           </a:xfrm>
           <a:prstGeom prst="rect">
             <a:avLst/>
@@ -6313,8 +7619,8 @@
         </p:nvSpPr>
         <p:spPr>
           <a:xfrm>
-            <a:off x="4366722" y="1795100"/>
-            <a:ext cx="1180561" cy="1058935"/>
+            <a:off x="4197616" y="2105891"/>
+            <a:ext cx="1122529" cy="748145"/>
           </a:xfrm>
           <a:prstGeom prst="roundRect">
             <a:avLst/>
@@ -7142,19 +8448,17 @@
       </p:sp>
       <p:pic>
         <p:nvPicPr>
-          <p:cNvPr id="7" name="Tartalom helye 6">
-            <a:extLst>
-              <a:ext uri="{FF2B5EF4-FFF2-40B4-BE49-F238E27FC236}">
-                <a16:creationId xmlns:a16="http://schemas.microsoft.com/office/drawing/2014/main" id="{85E37C3A-BB42-4648-B913-F8ECB2D027E2}"/>
+          <p:cNvPr id="6" name="Kép 5">
+            <a:extLst>
+              <a:ext uri="{FF2B5EF4-FFF2-40B4-BE49-F238E27FC236}">
+                <a16:creationId xmlns:a16="http://schemas.microsoft.com/office/drawing/2014/main" id="{0209C801-A24E-49EA-BC92-B09A9078498A}"/>
               </a:ext>
             </a:extLst>
           </p:cNvPr>
           <p:cNvPicPr>
-            <a:picLocks noGrp="1" noChangeAspect="1"/>
+            <a:picLocks noChangeAspect="1"/>
           </p:cNvPicPr>
-          <p:nvPr>
-            <p:ph idx="1"/>
-          </p:nvPr>
+          <p:nvPr/>
         </p:nvPicPr>
         <p:blipFill>
           <a:blip r:embed="rId2"/>
@@ -7164,9 +8468,12 @@
         </p:blipFill>
         <p:spPr>
           <a:xfrm>
-            <a:off x="4165889" y="1004923"/>
-            <a:ext cx="7945936" cy="5229677"/>
+            <a:off x="4271125" y="1490975"/>
+            <a:ext cx="7730677" cy="4078551"/>
           </a:xfrm>
+          <a:prstGeom prst="rect">
+            <a:avLst/>
+          </a:prstGeom>
         </p:spPr>
       </p:pic>
       <p:sp>
@@ -7183,8 +8490,8 @@
         </p:nvSpPr>
         <p:spPr>
           <a:xfrm>
-            <a:off x="5676107" y="1986555"/>
-            <a:ext cx="5712330" cy="3866522"/>
+            <a:off x="5413123" y="2272145"/>
+            <a:ext cx="6474077" cy="2867892"/>
           </a:xfrm>
           <a:prstGeom prst="roundRect">
             <a:avLst>
@@ -8001,7 +9308,7 @@
         </p:nvSpPr>
         <p:spPr>
           <a:xfrm>
-            <a:off x="-14782" y="3456177"/>
+            <a:off x="0" y="3221736"/>
             <a:ext cx="1705567" cy="995205"/>
           </a:xfrm>
           <a:prstGeom prst="rect">
@@ -8071,7 +9378,7 @@
         </p:nvSpPr>
         <p:spPr>
           <a:xfrm>
-            <a:off x="1606101" y="3484785"/>
+            <a:off x="1630548" y="3238965"/>
             <a:ext cx="2353828" cy="995205"/>
           </a:xfrm>
           <a:prstGeom prst="rect">
@@ -8193,7 +9500,7 @@
         </p:nvSpPr>
         <p:spPr>
           <a:xfrm>
-            <a:off x="0" y="4675841"/>
+            <a:off x="21876" y="4163434"/>
             <a:ext cx="1705567" cy="995205"/>
           </a:xfrm>
           <a:prstGeom prst="rect">
@@ -8263,7 +9570,7 @@
         </p:nvSpPr>
         <p:spPr>
           <a:xfrm>
-            <a:off x="1491100" y="4636718"/>
+            <a:off x="1494658" y="4149097"/>
             <a:ext cx="2006330" cy="1410909"/>
           </a:xfrm>
           <a:prstGeom prst="rect">
@@ -8319,10 +9626,10 @@
       </p:sp>
       <p:pic>
         <p:nvPicPr>
-          <p:cNvPr id="6" name="Tartalom helye 5">
-            <a:extLst>
-              <a:ext uri="{FF2B5EF4-FFF2-40B4-BE49-F238E27FC236}">
-                <a16:creationId xmlns:a16="http://schemas.microsoft.com/office/drawing/2014/main" id="{47ACBA2B-075F-464D-A3C1-BBD0121ACD1A}"/>
+          <p:cNvPr id="31" name="Tartalom helye 30">
+            <a:extLst>
+              <a:ext uri="{FF2B5EF4-FFF2-40B4-BE49-F238E27FC236}">
+                <a16:creationId xmlns:a16="http://schemas.microsoft.com/office/drawing/2014/main" id="{AC2EB0A9-3882-4A69-A1CC-2468E2E99E5A}"/>
               </a:ext>
             </a:extLst>
           </p:cNvPr>
@@ -8341,8 +9648,8 @@
         </p:blipFill>
         <p:spPr>
           <a:xfrm>
-            <a:off x="4545927" y="1038407"/>
-            <a:ext cx="7347084" cy="4835539"/>
+            <a:off x="4158620" y="1182262"/>
+            <a:ext cx="7897677" cy="4166656"/>
           </a:xfrm>
         </p:spPr>
       </p:pic>
@@ -8360,8 +9667,8 @@
         </p:nvSpPr>
         <p:spPr>
           <a:xfrm>
-            <a:off x="5957455" y="1986555"/>
-            <a:ext cx="5273242" cy="2045118"/>
+            <a:off x="5342322" y="1937269"/>
+            <a:ext cx="5782877" cy="2967240"/>
           </a:xfrm>
           <a:prstGeom prst="roundRect">
             <a:avLst>
@@ -8414,8 +9721,190 @@
         </p:nvSpPr>
         <p:spPr>
           <a:xfrm>
-            <a:off x="9136093" y="5566670"/>
+            <a:off x="8048162" y="5099214"/>
             <a:ext cx="1365651" cy="304110"/>
+          </a:xfrm>
+          <a:prstGeom prst="roundRect">
+            <a:avLst>
+              <a:gd name="adj" fmla="val 8135"/>
+            </a:avLst>
+          </a:prstGeom>
+          <a:noFill/>
+          <a:ln w="38100">
+            <a:solidFill>
+              <a:srgbClr val="FF0000"/>
+            </a:solidFill>
+          </a:ln>
+        </p:spPr>
+        <p:style>
+          <a:lnRef idx="2">
+            <a:schemeClr val="accent1">
+              <a:shade val="50000"/>
+            </a:schemeClr>
+          </a:lnRef>
+          <a:fillRef idx="1">
+            <a:schemeClr val="accent1"/>
+          </a:fillRef>
+          <a:effectRef idx="0">
+            <a:schemeClr val="accent1"/>
+          </a:effectRef>
+          <a:fontRef idx="minor">
+            <a:schemeClr val="lt1"/>
+          </a:fontRef>
+        </p:style>
+        <p:txBody>
+          <a:bodyPr rtlCol="0" anchor="ctr"/>
+          <a:lstStyle/>
+          <a:p>
+            <a:pPr algn="ctr"/>
+            <a:endParaRPr lang="hu-HU"/>
+          </a:p>
+        </p:txBody>
+      </p:sp>
+      <p:sp>
+        <p:nvSpPr>
+          <p:cNvPr id="32" name="Cím 1">
+            <a:extLst>
+              <a:ext uri="{FF2B5EF4-FFF2-40B4-BE49-F238E27FC236}">
+                <a16:creationId xmlns:a16="http://schemas.microsoft.com/office/drawing/2014/main" id="{22293393-899E-4CF0-8268-77A7E10F2B1B}"/>
+              </a:ext>
+            </a:extLst>
+          </p:cNvPr>
+          <p:cNvSpPr txBox="1">
+            <a:spLocks/>
+          </p:cNvSpPr>
+          <p:nvPr/>
+        </p:nvSpPr>
+        <p:spPr>
+          <a:xfrm>
+            <a:off x="25151" y="5532795"/>
+            <a:ext cx="1705567" cy="995205"/>
+          </a:xfrm>
+          <a:prstGeom prst="rect">
+            <a:avLst/>
+          </a:prstGeom>
+        </p:spPr>
+        <p:txBody>
+          <a:bodyPr vert="horz" lIns="91440" tIns="45720" rIns="91440" bIns="45720" rtlCol="0" anchor="t">
+            <a:normAutofit fontScale="97500"/>
+          </a:bodyPr>
+          <a:lstStyle>
+            <a:lvl1pPr algn="ctr" defTabSz="914400" rtl="0" eaLnBrk="1" latinLnBrk="0" hangingPunct="1">
+              <a:lnSpc>
+                <a:spcPct val="90000"/>
+              </a:lnSpc>
+              <a:spcBef>
+                <a:spcPct val="0"/>
+              </a:spcBef>
+              <a:buNone/>
+              <a:defRPr sz="6000" kern="1200">
+                <a:solidFill>
+                  <a:schemeClr val="tx1"/>
+                </a:solidFill>
+                <a:latin typeface="+mj-lt"/>
+                <a:ea typeface="+mj-ea"/>
+                <a:cs typeface="+mj-cs"/>
+              </a:defRPr>
+            </a:lvl1pPr>
+          </a:lstStyle>
+          <a:p>
+            <a:r>
+              <a:rPr lang="hu-HU" sz="2000" dirty="0">
+                <a:solidFill>
+                  <a:srgbClr val="FFFFFF"/>
+                </a:solidFill>
+              </a:rPr>
+              <a:t>„Törlés” gomb:</a:t>
+            </a:r>
+            <a:br>
+              <a:rPr lang="hu-HU" sz="2000" dirty="0">
+                <a:solidFill>
+                  <a:srgbClr val="FFFFFF"/>
+                </a:solidFill>
+              </a:rPr>
+            </a:br>
+            <a:endParaRPr lang="hu-HU" sz="2000" dirty="0">
+              <a:solidFill>
+                <a:srgbClr val="FFFFFF"/>
+              </a:solidFill>
+            </a:endParaRPr>
+          </a:p>
+        </p:txBody>
+      </p:sp>
+      <p:sp>
+        <p:nvSpPr>
+          <p:cNvPr id="33" name="Cím 1">
+            <a:extLst>
+              <a:ext uri="{FF2B5EF4-FFF2-40B4-BE49-F238E27FC236}">
+                <a16:creationId xmlns:a16="http://schemas.microsoft.com/office/drawing/2014/main" id="{422C8189-CA58-451B-82F9-E4751996C6FD}"/>
+              </a:ext>
+            </a:extLst>
+          </p:cNvPr>
+          <p:cNvSpPr txBox="1">
+            <a:spLocks/>
+          </p:cNvSpPr>
+          <p:nvPr/>
+        </p:nvSpPr>
+        <p:spPr>
+          <a:xfrm>
+            <a:off x="1622694" y="5528098"/>
+            <a:ext cx="2006330" cy="1410909"/>
+          </a:xfrm>
+          <a:prstGeom prst="rect">
+            <a:avLst/>
+          </a:prstGeom>
+        </p:spPr>
+        <p:txBody>
+          <a:bodyPr vert="horz" lIns="91440" tIns="45720" rIns="91440" bIns="45720" rtlCol="0" anchor="t">
+            <a:normAutofit fontScale="97500"/>
+          </a:bodyPr>
+          <a:lstStyle>
+            <a:lvl1pPr algn="ctr" defTabSz="914400" rtl="0" eaLnBrk="1" latinLnBrk="0" hangingPunct="1">
+              <a:lnSpc>
+                <a:spcPct val="90000"/>
+              </a:lnSpc>
+              <a:spcBef>
+                <a:spcPct val="0"/>
+              </a:spcBef>
+              <a:buNone/>
+              <a:defRPr sz="6000" kern="1200">
+                <a:solidFill>
+                  <a:schemeClr val="tx1"/>
+                </a:solidFill>
+                <a:latin typeface="+mj-lt"/>
+                <a:ea typeface="+mj-ea"/>
+                <a:cs typeface="+mj-cs"/>
+              </a:defRPr>
+            </a:lvl1pPr>
+          </a:lstStyle>
+          <a:p>
+            <a:r>
+              <a:rPr lang="hu-HU" sz="2000" dirty="0">
+                <a:solidFill>
+                  <a:srgbClr val="FFFFFF"/>
+                </a:solidFill>
+              </a:rPr>
+              <a:t>Törli az adott sort a táblázatból.</a:t>
+            </a:r>
+          </a:p>
+        </p:txBody>
+      </p:sp>
+      <p:sp>
+        <p:nvSpPr>
+          <p:cNvPr id="34" name="Téglalap: lekerekített 33">
+            <a:extLst>
+              <a:ext uri="{FF2B5EF4-FFF2-40B4-BE49-F238E27FC236}">
+                <a16:creationId xmlns:a16="http://schemas.microsoft.com/office/drawing/2014/main" id="{4E6F234A-C975-4FE1-AE05-7E6FCF5CADC3}"/>
+              </a:ext>
+            </a:extLst>
+          </p:cNvPr>
+          <p:cNvSpPr/>
+          <p:nvPr/>
+        </p:nvSpPr>
+        <p:spPr>
+          <a:xfrm>
+            <a:off x="11360727" y="1919450"/>
+            <a:ext cx="353238" cy="2985059"/>
           </a:xfrm>
           <a:prstGeom prst="roundRect">
             <a:avLst>

</xml_diff>